<commit_message>
Updated notes on storyboard from client feedback
</commit_message>
<xml_diff>
--- a/other/StoryBoardAllie.pptx
+++ b/other/StoryBoardAllie.pptx
@@ -4,6 +4,9 @@
   <p:sldMasterIdLst>
     <p:sldMasterId id="2147483648" r:id="rId1"/>
   </p:sldMasterIdLst>
+  <p:notesMasterIdLst>
+    <p:notesMasterId r:id="rId8"/>
+  </p:notesMasterIdLst>
   <p:sldIdLst>
     <p:sldId id="258" r:id="rId2"/>
     <p:sldId id="260" r:id="rId3"/>
@@ -112,6 +115,722 @@
 </p:presentation>
 </file>
 
+<file path=ppt/notesMasters/notesMaster1.xml><?xml version="1.0" encoding="utf-8"?>
+<p:notesMaster xmlns:a="http://schemas.openxmlformats.org/drawingml/2006/main" xmlns:r="http://schemas.openxmlformats.org/officeDocument/2006/relationships" xmlns:p="http://schemas.openxmlformats.org/presentationml/2006/main">
+  <p:cSld>
+    <p:bg>
+      <p:bgRef idx="1001">
+        <a:schemeClr val="bg1"/>
+      </p:bgRef>
+    </p:bg>
+    <p:spTree>
+      <p:nvGrpSpPr>
+        <p:cNvPr id="1" name=""/>
+        <p:cNvGrpSpPr/>
+        <p:nvPr/>
+      </p:nvGrpSpPr>
+      <p:grpSpPr>
+        <a:xfrm>
+          <a:off x="0" y="0"/>
+          <a:ext cx="0" cy="0"/>
+          <a:chOff x="0" y="0"/>
+          <a:chExt cx="0" cy="0"/>
+        </a:xfrm>
+      </p:grpSpPr>
+      <p:sp>
+        <p:nvSpPr>
+          <p:cNvPr id="2" name="Header Placeholder 1"/>
+          <p:cNvSpPr>
+            <a:spLocks noGrp="1"/>
+          </p:cNvSpPr>
+          <p:nvPr>
+            <p:ph type="hdr" sz="quarter"/>
+          </p:nvPr>
+        </p:nvSpPr>
+        <p:spPr>
+          <a:xfrm>
+            <a:off x="0" y="0"/>
+            <a:ext cx="2971800" cy="457200"/>
+          </a:xfrm>
+          <a:prstGeom prst="rect">
+            <a:avLst/>
+          </a:prstGeom>
+        </p:spPr>
+        <p:txBody>
+          <a:bodyPr vert="horz" lIns="91440" tIns="45720" rIns="91440" bIns="45720" rtlCol="0"/>
+          <a:lstStyle>
+            <a:lvl1pPr algn="l">
+              <a:defRPr sz="1200"/>
+            </a:lvl1pPr>
+          </a:lstStyle>
+          <a:p>
+            <a:endParaRPr lang="en-US"/>
+          </a:p>
+        </p:txBody>
+      </p:sp>
+      <p:sp>
+        <p:nvSpPr>
+          <p:cNvPr id="3" name="Date Placeholder 2"/>
+          <p:cNvSpPr>
+            <a:spLocks noGrp="1"/>
+          </p:cNvSpPr>
+          <p:nvPr>
+            <p:ph type="dt" idx="1"/>
+          </p:nvPr>
+        </p:nvSpPr>
+        <p:spPr>
+          <a:xfrm>
+            <a:off x="3884613" y="0"/>
+            <a:ext cx="2971800" cy="457200"/>
+          </a:xfrm>
+          <a:prstGeom prst="rect">
+            <a:avLst/>
+          </a:prstGeom>
+        </p:spPr>
+        <p:txBody>
+          <a:bodyPr vert="horz" lIns="91440" tIns="45720" rIns="91440" bIns="45720" rtlCol="0"/>
+          <a:lstStyle>
+            <a:lvl1pPr algn="r">
+              <a:defRPr sz="1200"/>
+            </a:lvl1pPr>
+          </a:lstStyle>
+          <a:p>
+            <a:fld id="{0F82D136-5890-4D2D-B4B5-B44F52F0702C}" type="datetimeFigureOut">
+              <a:rPr lang="en-US" smtClean="0"/>
+              <a:t>9/25/2011</a:t>
+            </a:fld>
+            <a:endParaRPr lang="en-US"/>
+          </a:p>
+        </p:txBody>
+      </p:sp>
+      <p:sp>
+        <p:nvSpPr>
+          <p:cNvPr id="4" name="Slide Image Placeholder 3"/>
+          <p:cNvSpPr>
+            <a:spLocks noGrp="1" noRot="1" noChangeAspect="1"/>
+          </p:cNvSpPr>
+          <p:nvPr>
+            <p:ph type="sldImg" idx="2"/>
+          </p:nvPr>
+        </p:nvSpPr>
+        <p:spPr>
+          <a:xfrm>
+            <a:off x="1143000" y="685800"/>
+            <a:ext cx="4572000" cy="3429000"/>
+          </a:xfrm>
+          <a:prstGeom prst="rect">
+            <a:avLst/>
+          </a:prstGeom>
+          <a:noFill/>
+          <a:ln w="12700">
+            <a:solidFill>
+              <a:prstClr val="black"/>
+            </a:solidFill>
+          </a:ln>
+        </p:spPr>
+        <p:txBody>
+          <a:bodyPr vert="horz" lIns="91440" tIns="45720" rIns="91440" bIns="45720" rtlCol="0" anchor="ctr"/>
+          <a:lstStyle/>
+          <a:p>
+            <a:endParaRPr lang="en-US"/>
+          </a:p>
+        </p:txBody>
+      </p:sp>
+      <p:sp>
+        <p:nvSpPr>
+          <p:cNvPr id="5" name="Notes Placeholder 4"/>
+          <p:cNvSpPr>
+            <a:spLocks noGrp="1"/>
+          </p:cNvSpPr>
+          <p:nvPr>
+            <p:ph type="body" sz="quarter" idx="3"/>
+          </p:nvPr>
+        </p:nvSpPr>
+        <p:spPr>
+          <a:xfrm>
+            <a:off x="685800" y="4343400"/>
+            <a:ext cx="5486400" cy="4114800"/>
+          </a:xfrm>
+          <a:prstGeom prst="rect">
+            <a:avLst/>
+          </a:prstGeom>
+        </p:spPr>
+        <p:txBody>
+          <a:bodyPr vert="horz" lIns="91440" tIns="45720" rIns="91440" bIns="45720" rtlCol="0"/>
+          <a:lstStyle/>
+          <a:p>
+            <a:pPr lvl="0"/>
+            <a:r>
+              <a:rPr lang="en-US" smtClean="0"/>
+              <a:t>Click to edit Master text styles</a:t>
+            </a:r>
+          </a:p>
+          <a:p>
+            <a:pPr lvl="1"/>
+            <a:r>
+              <a:rPr lang="en-US" smtClean="0"/>
+              <a:t>Second level</a:t>
+            </a:r>
+          </a:p>
+          <a:p>
+            <a:pPr lvl="2"/>
+            <a:r>
+              <a:rPr lang="en-US" smtClean="0"/>
+              <a:t>Third level</a:t>
+            </a:r>
+          </a:p>
+          <a:p>
+            <a:pPr lvl="3"/>
+            <a:r>
+              <a:rPr lang="en-US" smtClean="0"/>
+              <a:t>Fourth level</a:t>
+            </a:r>
+          </a:p>
+          <a:p>
+            <a:pPr lvl="4"/>
+            <a:r>
+              <a:rPr lang="en-US" smtClean="0"/>
+              <a:t>Fifth level</a:t>
+            </a:r>
+            <a:endParaRPr lang="en-US"/>
+          </a:p>
+        </p:txBody>
+      </p:sp>
+      <p:sp>
+        <p:nvSpPr>
+          <p:cNvPr id="6" name="Footer Placeholder 5"/>
+          <p:cNvSpPr>
+            <a:spLocks noGrp="1"/>
+          </p:cNvSpPr>
+          <p:nvPr>
+            <p:ph type="ftr" sz="quarter" idx="4"/>
+          </p:nvPr>
+        </p:nvSpPr>
+        <p:spPr>
+          <a:xfrm>
+            <a:off x="0" y="8685213"/>
+            <a:ext cx="2971800" cy="457200"/>
+          </a:xfrm>
+          <a:prstGeom prst="rect">
+            <a:avLst/>
+          </a:prstGeom>
+        </p:spPr>
+        <p:txBody>
+          <a:bodyPr vert="horz" lIns="91440" tIns="45720" rIns="91440" bIns="45720" rtlCol="0" anchor="b"/>
+          <a:lstStyle>
+            <a:lvl1pPr algn="l">
+              <a:defRPr sz="1200"/>
+            </a:lvl1pPr>
+          </a:lstStyle>
+          <a:p>
+            <a:endParaRPr lang="en-US"/>
+          </a:p>
+        </p:txBody>
+      </p:sp>
+      <p:sp>
+        <p:nvSpPr>
+          <p:cNvPr id="7" name="Slide Number Placeholder 6"/>
+          <p:cNvSpPr>
+            <a:spLocks noGrp="1"/>
+          </p:cNvSpPr>
+          <p:nvPr>
+            <p:ph type="sldNum" sz="quarter" idx="5"/>
+          </p:nvPr>
+        </p:nvSpPr>
+        <p:spPr>
+          <a:xfrm>
+            <a:off x="3884613" y="8685213"/>
+            <a:ext cx="2971800" cy="457200"/>
+          </a:xfrm>
+          <a:prstGeom prst="rect">
+            <a:avLst/>
+          </a:prstGeom>
+        </p:spPr>
+        <p:txBody>
+          <a:bodyPr vert="horz" lIns="91440" tIns="45720" rIns="91440" bIns="45720" rtlCol="0" anchor="b"/>
+          <a:lstStyle>
+            <a:lvl1pPr algn="r">
+              <a:defRPr sz="1200"/>
+            </a:lvl1pPr>
+          </a:lstStyle>
+          <a:p>
+            <a:fld id="{D5051250-98A1-4263-9E5A-72FCEE9F94B2}" type="slidenum">
+              <a:rPr lang="en-US" smtClean="0"/>
+              <a:t>‹#›</a:t>
+            </a:fld>
+            <a:endParaRPr lang="en-US"/>
+          </a:p>
+        </p:txBody>
+      </p:sp>
+    </p:spTree>
+    <p:extLst>
+      <p:ext uri="{BB962C8B-B14F-4D97-AF65-F5344CB8AC3E}">
+        <p14:creationId xmlns:p14="http://schemas.microsoft.com/office/powerpoint/2010/main" val="878775164"/>
+      </p:ext>
+    </p:extLst>
+  </p:cSld>
+  <p:clrMap bg1="lt1" tx1="dk1" bg2="lt2" tx2="dk2" accent1="accent1" accent2="accent2" accent3="accent3" accent4="accent4" accent5="accent5" accent6="accent6" hlink="hlink" folHlink="folHlink"/>
+  <p:notesStyle>
+    <a:lvl1pPr marL="0" algn="l" defTabSz="914400" rtl="0" eaLnBrk="1" latinLnBrk="0" hangingPunct="1">
+      <a:defRPr sz="1200" kern="1200">
+        <a:solidFill>
+          <a:schemeClr val="tx1"/>
+        </a:solidFill>
+        <a:latin typeface="+mn-lt"/>
+        <a:ea typeface="+mn-ea"/>
+        <a:cs typeface="+mn-cs"/>
+      </a:defRPr>
+    </a:lvl1pPr>
+    <a:lvl2pPr marL="457200" algn="l" defTabSz="914400" rtl="0" eaLnBrk="1" latinLnBrk="0" hangingPunct="1">
+      <a:defRPr sz="1200" kern="1200">
+        <a:solidFill>
+          <a:schemeClr val="tx1"/>
+        </a:solidFill>
+        <a:latin typeface="+mn-lt"/>
+        <a:ea typeface="+mn-ea"/>
+        <a:cs typeface="+mn-cs"/>
+      </a:defRPr>
+    </a:lvl2pPr>
+    <a:lvl3pPr marL="914400" algn="l" defTabSz="914400" rtl="0" eaLnBrk="1" latinLnBrk="0" hangingPunct="1">
+      <a:defRPr sz="1200" kern="1200">
+        <a:solidFill>
+          <a:schemeClr val="tx1"/>
+        </a:solidFill>
+        <a:latin typeface="+mn-lt"/>
+        <a:ea typeface="+mn-ea"/>
+        <a:cs typeface="+mn-cs"/>
+      </a:defRPr>
+    </a:lvl3pPr>
+    <a:lvl4pPr marL="1371600" algn="l" defTabSz="914400" rtl="0" eaLnBrk="1" latinLnBrk="0" hangingPunct="1">
+      <a:defRPr sz="1200" kern="1200">
+        <a:solidFill>
+          <a:schemeClr val="tx1"/>
+        </a:solidFill>
+        <a:latin typeface="+mn-lt"/>
+        <a:ea typeface="+mn-ea"/>
+        <a:cs typeface="+mn-cs"/>
+      </a:defRPr>
+    </a:lvl4pPr>
+    <a:lvl5pPr marL="1828800" algn="l" defTabSz="914400" rtl="0" eaLnBrk="1" latinLnBrk="0" hangingPunct="1">
+      <a:defRPr sz="1200" kern="1200">
+        <a:solidFill>
+          <a:schemeClr val="tx1"/>
+        </a:solidFill>
+        <a:latin typeface="+mn-lt"/>
+        <a:ea typeface="+mn-ea"/>
+        <a:cs typeface="+mn-cs"/>
+      </a:defRPr>
+    </a:lvl5pPr>
+    <a:lvl6pPr marL="2286000" algn="l" defTabSz="914400" rtl="0" eaLnBrk="1" latinLnBrk="0" hangingPunct="1">
+      <a:defRPr sz="1200" kern="1200">
+        <a:solidFill>
+          <a:schemeClr val="tx1"/>
+        </a:solidFill>
+        <a:latin typeface="+mn-lt"/>
+        <a:ea typeface="+mn-ea"/>
+        <a:cs typeface="+mn-cs"/>
+      </a:defRPr>
+    </a:lvl6pPr>
+    <a:lvl7pPr marL="2743200" algn="l" defTabSz="914400" rtl="0" eaLnBrk="1" latinLnBrk="0" hangingPunct="1">
+      <a:defRPr sz="1200" kern="1200">
+        <a:solidFill>
+          <a:schemeClr val="tx1"/>
+        </a:solidFill>
+        <a:latin typeface="+mn-lt"/>
+        <a:ea typeface="+mn-ea"/>
+        <a:cs typeface="+mn-cs"/>
+      </a:defRPr>
+    </a:lvl7pPr>
+    <a:lvl8pPr marL="3200400" algn="l" defTabSz="914400" rtl="0" eaLnBrk="1" latinLnBrk="0" hangingPunct="1">
+      <a:defRPr sz="1200" kern="1200">
+        <a:solidFill>
+          <a:schemeClr val="tx1"/>
+        </a:solidFill>
+        <a:latin typeface="+mn-lt"/>
+        <a:ea typeface="+mn-ea"/>
+        <a:cs typeface="+mn-cs"/>
+      </a:defRPr>
+    </a:lvl8pPr>
+    <a:lvl9pPr marL="3657600" algn="l" defTabSz="914400" rtl="0" eaLnBrk="1" latinLnBrk="0" hangingPunct="1">
+      <a:defRPr sz="1200" kern="1200">
+        <a:solidFill>
+          <a:schemeClr val="tx1"/>
+        </a:solidFill>
+        <a:latin typeface="+mn-lt"/>
+        <a:ea typeface="+mn-ea"/>
+        <a:cs typeface="+mn-cs"/>
+      </a:defRPr>
+    </a:lvl9pPr>
+  </p:notesStyle>
+</p:notesMaster>
+</file>
+
+<file path=ppt/notesSlides/notesSlide1.xml><?xml version="1.0" encoding="utf-8"?>
+<p:notes xmlns:a="http://schemas.openxmlformats.org/drawingml/2006/main" xmlns:r="http://schemas.openxmlformats.org/officeDocument/2006/relationships" xmlns:p="http://schemas.openxmlformats.org/presentationml/2006/main">
+  <p:cSld>
+    <p:spTree>
+      <p:nvGrpSpPr>
+        <p:cNvPr id="1" name=""/>
+        <p:cNvGrpSpPr/>
+        <p:nvPr/>
+      </p:nvGrpSpPr>
+      <p:grpSpPr>
+        <a:xfrm>
+          <a:off x="0" y="0"/>
+          <a:ext cx="0" cy="0"/>
+          <a:chOff x="0" y="0"/>
+          <a:chExt cx="0" cy="0"/>
+        </a:xfrm>
+      </p:grpSpPr>
+      <p:sp>
+        <p:nvSpPr>
+          <p:cNvPr id="2" name="Slide Image Placeholder 1"/>
+          <p:cNvSpPr>
+            <a:spLocks noGrp="1" noRot="1" noChangeAspect="1"/>
+          </p:cNvSpPr>
+          <p:nvPr>
+            <p:ph type="sldImg"/>
+          </p:nvPr>
+        </p:nvSpPr>
+        <p:spPr/>
+      </p:sp>
+      <p:sp>
+        <p:nvSpPr>
+          <p:cNvPr id="3" name="Notes Placeholder 2"/>
+          <p:cNvSpPr>
+            <a:spLocks noGrp="1"/>
+          </p:cNvSpPr>
+          <p:nvPr>
+            <p:ph type="body" idx="1"/>
+          </p:nvPr>
+        </p:nvSpPr>
+        <p:spPr/>
+        <p:txBody>
+          <a:bodyPr/>
+          <a:lstStyle/>
+          <a:p>
+            <a:r>
+              <a:rPr lang="en-US" dirty="0" smtClean="0"/>
+              <a:t>List dates</a:t>
+            </a:r>
+          </a:p>
+          <a:p>
+            <a:r>
+              <a:rPr lang="en-US" dirty="0" smtClean="0"/>
+              <a:t>Who is running it</a:t>
+            </a:r>
+          </a:p>
+          <a:p>
+            <a:endParaRPr lang="en-US" dirty="0"/>
+          </a:p>
+        </p:txBody>
+      </p:sp>
+      <p:sp>
+        <p:nvSpPr>
+          <p:cNvPr id="4" name="Slide Number Placeholder 3"/>
+          <p:cNvSpPr>
+            <a:spLocks noGrp="1"/>
+          </p:cNvSpPr>
+          <p:nvPr>
+            <p:ph type="sldNum" sz="quarter" idx="10"/>
+          </p:nvPr>
+        </p:nvSpPr>
+        <p:spPr/>
+        <p:txBody>
+          <a:bodyPr/>
+          <a:lstStyle/>
+          <a:p>
+            <a:fld id="{D5051250-98A1-4263-9E5A-72FCEE9F94B2}" type="slidenum">
+              <a:rPr lang="en-US" smtClean="0"/>
+              <a:t>2</a:t>
+            </a:fld>
+            <a:endParaRPr lang="en-US"/>
+          </a:p>
+        </p:txBody>
+      </p:sp>
+    </p:spTree>
+    <p:extLst>
+      <p:ext uri="{BB962C8B-B14F-4D97-AF65-F5344CB8AC3E}">
+        <p14:creationId xmlns:p14="http://schemas.microsoft.com/office/powerpoint/2010/main" val="2850259698"/>
+      </p:ext>
+    </p:extLst>
+  </p:cSld>
+  <p:clrMapOvr>
+    <a:masterClrMapping/>
+  </p:clrMapOvr>
+</p:notes>
+</file>
+
+<file path=ppt/notesSlides/notesSlide2.xml><?xml version="1.0" encoding="utf-8"?>
+<p:notes xmlns:a="http://schemas.openxmlformats.org/drawingml/2006/main" xmlns:r="http://schemas.openxmlformats.org/officeDocument/2006/relationships" xmlns:p="http://schemas.openxmlformats.org/presentationml/2006/main">
+  <p:cSld>
+    <p:spTree>
+      <p:nvGrpSpPr>
+        <p:cNvPr id="1" name=""/>
+        <p:cNvGrpSpPr/>
+        <p:nvPr/>
+      </p:nvGrpSpPr>
+      <p:grpSpPr>
+        <a:xfrm>
+          <a:off x="0" y="0"/>
+          <a:ext cx="0" cy="0"/>
+          <a:chOff x="0" y="0"/>
+          <a:chExt cx="0" cy="0"/>
+        </a:xfrm>
+      </p:grpSpPr>
+      <p:sp>
+        <p:nvSpPr>
+          <p:cNvPr id="2" name="Slide Image Placeholder 1"/>
+          <p:cNvSpPr>
+            <a:spLocks noGrp="1" noRot="1" noChangeAspect="1"/>
+          </p:cNvSpPr>
+          <p:nvPr>
+            <p:ph type="sldImg"/>
+          </p:nvPr>
+        </p:nvSpPr>
+        <p:spPr/>
+      </p:sp>
+      <p:sp>
+        <p:nvSpPr>
+          <p:cNvPr id="3" name="Notes Placeholder 2"/>
+          <p:cNvSpPr>
+            <a:spLocks noGrp="1"/>
+          </p:cNvSpPr>
+          <p:nvPr>
+            <p:ph type="body" idx="1"/>
+          </p:nvPr>
+        </p:nvSpPr>
+        <p:spPr/>
+        <p:txBody>
+          <a:bodyPr/>
+          <a:lstStyle/>
+          <a:p>
+            <a:r>
+              <a:rPr lang="en-US" dirty="0" smtClean="0"/>
+              <a:t>Add “EULA” type consent</a:t>
+            </a:r>
+            <a:endParaRPr lang="en-US" dirty="0"/>
+          </a:p>
+        </p:txBody>
+      </p:sp>
+      <p:sp>
+        <p:nvSpPr>
+          <p:cNvPr id="4" name="Slide Number Placeholder 3"/>
+          <p:cNvSpPr>
+            <a:spLocks noGrp="1"/>
+          </p:cNvSpPr>
+          <p:nvPr>
+            <p:ph type="sldNum" sz="quarter" idx="10"/>
+          </p:nvPr>
+        </p:nvSpPr>
+        <p:spPr/>
+        <p:txBody>
+          <a:bodyPr/>
+          <a:lstStyle/>
+          <a:p>
+            <a:fld id="{D5051250-98A1-4263-9E5A-72FCEE9F94B2}" type="slidenum">
+              <a:rPr lang="en-US" smtClean="0"/>
+              <a:t>3</a:t>
+            </a:fld>
+            <a:endParaRPr lang="en-US"/>
+          </a:p>
+        </p:txBody>
+      </p:sp>
+    </p:spTree>
+    <p:extLst>
+      <p:ext uri="{BB962C8B-B14F-4D97-AF65-F5344CB8AC3E}">
+        <p14:creationId xmlns:p14="http://schemas.microsoft.com/office/powerpoint/2010/main" val="2048539117"/>
+      </p:ext>
+    </p:extLst>
+  </p:cSld>
+  <p:clrMapOvr>
+    <a:masterClrMapping/>
+  </p:clrMapOvr>
+</p:notes>
+</file>
+
+<file path=ppt/notesSlides/notesSlide3.xml><?xml version="1.0" encoding="utf-8"?>
+<p:notes xmlns:a="http://schemas.openxmlformats.org/drawingml/2006/main" xmlns:r="http://schemas.openxmlformats.org/officeDocument/2006/relationships" xmlns:p="http://schemas.openxmlformats.org/presentationml/2006/main">
+  <p:cSld>
+    <p:spTree>
+      <p:nvGrpSpPr>
+        <p:cNvPr id="1" name=""/>
+        <p:cNvGrpSpPr/>
+        <p:nvPr/>
+      </p:nvGrpSpPr>
+      <p:grpSpPr>
+        <a:xfrm>
+          <a:off x="0" y="0"/>
+          <a:ext cx="0" cy="0"/>
+          <a:chOff x="0" y="0"/>
+          <a:chExt cx="0" cy="0"/>
+        </a:xfrm>
+      </p:grpSpPr>
+      <p:sp>
+        <p:nvSpPr>
+          <p:cNvPr id="2" name="Slide Image Placeholder 1"/>
+          <p:cNvSpPr>
+            <a:spLocks noGrp="1" noRot="1" noChangeAspect="1"/>
+          </p:cNvSpPr>
+          <p:nvPr>
+            <p:ph type="sldImg"/>
+          </p:nvPr>
+        </p:nvSpPr>
+        <p:spPr/>
+      </p:sp>
+      <p:sp>
+        <p:nvSpPr>
+          <p:cNvPr id="3" name="Notes Placeholder 2"/>
+          <p:cNvSpPr>
+            <a:spLocks noGrp="1"/>
+          </p:cNvSpPr>
+          <p:nvPr>
+            <p:ph type="body" idx="1"/>
+          </p:nvPr>
+        </p:nvSpPr>
+        <p:spPr/>
+        <p:txBody>
+          <a:bodyPr/>
+          <a:lstStyle/>
+          <a:p>
+            <a:r>
+              <a:rPr lang="en-US" dirty="0" smtClean="0"/>
+              <a:t>Table based</a:t>
+            </a:r>
+            <a:endParaRPr lang="en-US" dirty="0"/>
+          </a:p>
+        </p:txBody>
+      </p:sp>
+      <p:sp>
+        <p:nvSpPr>
+          <p:cNvPr id="4" name="Slide Number Placeholder 3"/>
+          <p:cNvSpPr>
+            <a:spLocks noGrp="1"/>
+          </p:cNvSpPr>
+          <p:nvPr>
+            <p:ph type="sldNum" sz="quarter" idx="10"/>
+          </p:nvPr>
+        </p:nvSpPr>
+        <p:spPr/>
+        <p:txBody>
+          <a:bodyPr/>
+          <a:lstStyle/>
+          <a:p>
+            <a:fld id="{D5051250-98A1-4263-9E5A-72FCEE9F94B2}" type="slidenum">
+              <a:rPr lang="en-US" smtClean="0"/>
+              <a:t>5</a:t>
+            </a:fld>
+            <a:endParaRPr lang="en-US"/>
+          </a:p>
+        </p:txBody>
+      </p:sp>
+    </p:spTree>
+    <p:extLst>
+      <p:ext uri="{BB962C8B-B14F-4D97-AF65-F5344CB8AC3E}">
+        <p14:creationId xmlns:p14="http://schemas.microsoft.com/office/powerpoint/2010/main" val="3683699227"/>
+      </p:ext>
+    </p:extLst>
+  </p:cSld>
+  <p:clrMapOvr>
+    <a:masterClrMapping/>
+  </p:clrMapOvr>
+</p:notes>
+</file>
+
+<file path=ppt/notesSlides/notesSlide4.xml><?xml version="1.0" encoding="utf-8"?>
+<p:notes xmlns:a="http://schemas.openxmlformats.org/drawingml/2006/main" xmlns:r="http://schemas.openxmlformats.org/officeDocument/2006/relationships" xmlns:p="http://schemas.openxmlformats.org/presentationml/2006/main">
+  <p:cSld>
+    <p:spTree>
+      <p:nvGrpSpPr>
+        <p:cNvPr id="1" name=""/>
+        <p:cNvGrpSpPr/>
+        <p:nvPr/>
+      </p:nvGrpSpPr>
+      <p:grpSpPr>
+        <a:xfrm>
+          <a:off x="0" y="0"/>
+          <a:ext cx="0" cy="0"/>
+          <a:chOff x="0" y="0"/>
+          <a:chExt cx="0" cy="0"/>
+        </a:xfrm>
+      </p:grpSpPr>
+      <p:sp>
+        <p:nvSpPr>
+          <p:cNvPr id="2" name="Slide Image Placeholder 1"/>
+          <p:cNvSpPr>
+            <a:spLocks noGrp="1" noRot="1" noChangeAspect="1"/>
+          </p:cNvSpPr>
+          <p:nvPr>
+            <p:ph type="sldImg"/>
+          </p:nvPr>
+        </p:nvSpPr>
+        <p:spPr/>
+      </p:sp>
+      <p:sp>
+        <p:nvSpPr>
+          <p:cNvPr id="3" name="Notes Placeholder 2"/>
+          <p:cNvSpPr>
+            <a:spLocks noGrp="1"/>
+          </p:cNvSpPr>
+          <p:nvPr>
+            <p:ph type="body" idx="1"/>
+          </p:nvPr>
+        </p:nvSpPr>
+        <p:spPr/>
+        <p:txBody>
+          <a:bodyPr/>
+          <a:lstStyle/>
+          <a:p>
+            <a:r>
+              <a:rPr lang="en-US" dirty="0" smtClean="0"/>
+              <a:t>Add Date time column</a:t>
+            </a:r>
+          </a:p>
+          <a:p>
+            <a:r>
+              <a:rPr lang="en-US" dirty="0" smtClean="0"/>
+              <a:t>Add description</a:t>
+            </a:r>
+            <a:endParaRPr lang="en-US" dirty="0"/>
+          </a:p>
+        </p:txBody>
+      </p:sp>
+      <p:sp>
+        <p:nvSpPr>
+          <p:cNvPr id="4" name="Slide Number Placeholder 3"/>
+          <p:cNvSpPr>
+            <a:spLocks noGrp="1"/>
+          </p:cNvSpPr>
+          <p:nvPr>
+            <p:ph type="sldNum" sz="quarter" idx="10"/>
+          </p:nvPr>
+        </p:nvSpPr>
+        <p:spPr/>
+        <p:txBody>
+          <a:bodyPr/>
+          <a:lstStyle/>
+          <a:p>
+            <a:fld id="{D5051250-98A1-4263-9E5A-72FCEE9F94B2}" type="slidenum">
+              <a:rPr lang="en-US" smtClean="0"/>
+              <a:t>6</a:t>
+            </a:fld>
+            <a:endParaRPr lang="en-US"/>
+          </a:p>
+        </p:txBody>
+      </p:sp>
+    </p:spTree>
+    <p:extLst>
+      <p:ext uri="{BB962C8B-B14F-4D97-AF65-F5344CB8AC3E}">
+        <p14:creationId xmlns:p14="http://schemas.microsoft.com/office/powerpoint/2010/main" val="1960759126"/>
+      </p:ext>
+    </p:extLst>
+  </p:cSld>
+  <p:clrMapOvr>
+    <a:masterClrMapping/>
+  </p:clrMapOvr>
+</p:notes>
+</file>
+
 <file path=ppt/slideLayouts/slideLayout1.xml><?xml version="1.0" encoding="utf-8"?>
 <p:sldLayout xmlns:a="http://schemas.openxmlformats.org/drawingml/2006/main" xmlns:r="http://schemas.openxmlformats.org/officeDocument/2006/relationships" xmlns:p="http://schemas.openxmlformats.org/presentationml/2006/main" type="title" preserve="1">
   <p:cSld name="Title Slide">
@@ -293,7 +1012,7 @@
           <a:p>
             <a:fld id="{0CFE0260-2AF6-4D88-BE87-C1C9B7FA407A}" type="datetimeFigureOut">
               <a:rPr lang="en-US" smtClean="0"/>
-              <a:t>9/20/2011</a:t>
+              <a:t>9/25/2011</a:t>
             </a:fld>
             <a:endParaRPr lang="en-US"/>
           </a:p>
@@ -463,7 +1182,7 @@
           <a:p>
             <a:fld id="{0CFE0260-2AF6-4D88-BE87-C1C9B7FA407A}" type="datetimeFigureOut">
               <a:rPr lang="en-US" smtClean="0"/>
-              <a:t>9/20/2011</a:t>
+              <a:t>9/25/2011</a:t>
             </a:fld>
             <a:endParaRPr lang="en-US"/>
           </a:p>
@@ -643,7 +1362,7 @@
           <a:p>
             <a:fld id="{0CFE0260-2AF6-4D88-BE87-C1C9B7FA407A}" type="datetimeFigureOut">
               <a:rPr lang="en-US" smtClean="0"/>
-              <a:t>9/20/2011</a:t>
+              <a:t>9/25/2011</a:t>
             </a:fld>
             <a:endParaRPr lang="en-US"/>
           </a:p>
@@ -813,7 +1532,7 @@
           <a:p>
             <a:fld id="{0CFE0260-2AF6-4D88-BE87-C1C9B7FA407A}" type="datetimeFigureOut">
               <a:rPr lang="en-US" smtClean="0"/>
-              <a:t>9/20/2011</a:t>
+              <a:t>9/25/2011</a:t>
             </a:fld>
             <a:endParaRPr lang="en-US"/>
           </a:p>
@@ -1059,7 +1778,7 @@
           <a:p>
             <a:fld id="{0CFE0260-2AF6-4D88-BE87-C1C9B7FA407A}" type="datetimeFigureOut">
               <a:rPr lang="en-US" smtClean="0"/>
-              <a:t>9/20/2011</a:t>
+              <a:t>9/25/2011</a:t>
             </a:fld>
             <a:endParaRPr lang="en-US"/>
           </a:p>
@@ -1347,7 +2066,7 @@
           <a:p>
             <a:fld id="{0CFE0260-2AF6-4D88-BE87-C1C9B7FA407A}" type="datetimeFigureOut">
               <a:rPr lang="en-US" smtClean="0"/>
-              <a:t>9/20/2011</a:t>
+              <a:t>9/25/2011</a:t>
             </a:fld>
             <a:endParaRPr lang="en-US"/>
           </a:p>
@@ -1769,7 +2488,7 @@
           <a:p>
             <a:fld id="{0CFE0260-2AF6-4D88-BE87-C1C9B7FA407A}" type="datetimeFigureOut">
               <a:rPr lang="en-US" smtClean="0"/>
-              <a:t>9/20/2011</a:t>
+              <a:t>9/25/2011</a:t>
             </a:fld>
             <a:endParaRPr lang="en-US"/>
           </a:p>
@@ -1887,7 +2606,7 @@
           <a:p>
             <a:fld id="{0CFE0260-2AF6-4D88-BE87-C1C9B7FA407A}" type="datetimeFigureOut">
               <a:rPr lang="en-US" smtClean="0"/>
-              <a:t>9/20/2011</a:t>
+              <a:t>9/25/2011</a:t>
             </a:fld>
             <a:endParaRPr lang="en-US"/>
           </a:p>
@@ -1982,7 +2701,7 @@
           <a:p>
             <a:fld id="{0CFE0260-2AF6-4D88-BE87-C1C9B7FA407A}" type="datetimeFigureOut">
               <a:rPr lang="en-US" smtClean="0"/>
-              <a:t>9/20/2011</a:t>
+              <a:t>9/25/2011</a:t>
             </a:fld>
             <a:endParaRPr lang="en-US"/>
           </a:p>
@@ -2259,7 +2978,7 @@
           <a:p>
             <a:fld id="{0CFE0260-2AF6-4D88-BE87-C1C9B7FA407A}" type="datetimeFigureOut">
               <a:rPr lang="en-US" smtClean="0"/>
-              <a:t>9/20/2011</a:t>
+              <a:t>9/25/2011</a:t>
             </a:fld>
             <a:endParaRPr lang="en-US"/>
           </a:p>
@@ -2512,7 +3231,7 @@
           <a:p>
             <a:fld id="{0CFE0260-2AF6-4D88-BE87-C1C9B7FA407A}" type="datetimeFigureOut">
               <a:rPr lang="en-US" smtClean="0"/>
-              <a:t>9/20/2011</a:t>
+              <a:t>9/25/2011</a:t>
             </a:fld>
             <a:endParaRPr lang="en-US"/>
           </a:p>
@@ -2725,7 +3444,7 @@
           <a:p>
             <a:fld id="{0CFE0260-2AF6-4D88-BE87-C1C9B7FA407A}" type="datetimeFigureOut">
               <a:rPr lang="en-US" smtClean="0"/>
-              <a:t>9/20/2011</a:t>
+              <a:t>9/25/2011</a:t>
             </a:fld>
             <a:endParaRPr lang="en-US"/>
           </a:p>
@@ -3573,7 +4292,7 @@
           <a:p>
             <a:r>
               <a:rPr lang="en-US" dirty="0" smtClean="0">
-                <a:hlinkClick r:id="rId2" action="ppaction://hlinksldjump"/>
+                <a:hlinkClick r:id="rId3" action="ppaction://hlinksldjump"/>
               </a:rPr>
               <a:t>Sign up for this Experiment</a:t>
             </a:r>
@@ -3753,7 +4472,7 @@
           <a:p>
             <a:r>
               <a:rPr lang="en-US" dirty="0" smtClean="0">
-                <a:hlinkClick r:id="rId2" action="ppaction://hlinksldjump"/>
+                <a:hlinkClick r:id="rId3" action="ppaction://hlinksldjump"/>
               </a:rPr>
               <a:t>Submit</a:t>
             </a:r>
@@ -4364,7 +5083,7 @@
           <a:p>
             <a:r>
               <a:rPr lang="en-US" dirty="0" smtClean="0">
-                <a:hlinkClick r:id="rId2" action="ppaction://hlinksldjump"/>
+                <a:hlinkClick r:id="rId3" action="ppaction://hlinksldjump"/>
               </a:rPr>
               <a:t>Create New Experiment</a:t>
             </a:r>
@@ -4375,7 +5094,7 @@
       <p:pic>
         <p:nvPicPr>
           <p:cNvPr id="2051" name="Picture 3">
-            <a:hlinkClick r:id="rId2" action="ppaction://hlinksldjump"/>
+            <a:hlinkClick r:id="rId3" action="ppaction://hlinksldjump"/>
           </p:cNvPr>
           <p:cNvPicPr>
             <a:picLocks noChangeAspect="1" noChangeArrowheads="1"/>
@@ -4383,7 +5102,7 @@
           <p:nvPr/>
         </p:nvPicPr>
         <p:blipFill>
-          <a:blip r:embed="rId3">
+          <a:blip r:embed="rId4">
             <a:extLst>
               <a:ext uri="{28A0092B-C50C-407E-A947-70E740481C1C}">
                 <a14:useLocalDpi xmlns:a14="http://schemas.microsoft.com/office/drawing/2010/main" val="0"/>
@@ -4654,7 +5373,7 @@
                     <a:p>
                       <a:r>
                         <a:rPr lang="en-US" dirty="0" smtClean="0">
-                          <a:hlinkClick r:id="rId2"/>
+                          <a:hlinkClick r:id="rId3"/>
                         </a:rPr>
                         <a:t>bob@ma.com</a:t>
                       </a:r>
@@ -4704,7 +5423,7 @@
                     <a:p>
                       <a:r>
                         <a:rPr lang="en-US" dirty="0" smtClean="0">
-                          <a:hlinkClick r:id="rId3"/>
+                          <a:hlinkClick r:id="rId4"/>
                         </a:rPr>
                         <a:t>sparks@ma.com</a:t>
                       </a:r>
@@ -4754,7 +5473,7 @@
                     <a:p>
                       <a:r>
                         <a:rPr lang="en-US" dirty="0" smtClean="0">
-                          <a:hlinkClick r:id="rId4"/>
+                          <a:hlinkClick r:id="rId5"/>
                         </a:rPr>
                         <a:t>jermy@ma.com</a:t>
                       </a:r>
@@ -4937,7 +5656,7 @@
           <a:p>
             <a:r>
               <a:rPr lang="en-US" dirty="0" smtClean="0">
-                <a:hlinkClick r:id="rId5" action="ppaction://hlinksldjump"/>
+                <a:hlinkClick r:id="rId6" action="ppaction://hlinksldjump"/>
               </a:rPr>
               <a:t>Save</a:t>
             </a:r>
@@ -5248,4 +5967,289 @@
   <a:objectDefaults/>
   <a:extraClrSchemeLst/>
 </a:theme>
+</file>
+
+<file path=ppt/theme/theme2.xml><?xml version="1.0" encoding="utf-8"?>
+<a:theme xmlns:a="http://schemas.openxmlformats.org/drawingml/2006/main" name="Office Theme">
+  <a:themeElements>
+    <a:clrScheme name="Office">
+      <a:dk1>
+        <a:sysClr val="windowText" lastClr="000000"/>
+      </a:dk1>
+      <a:lt1>
+        <a:sysClr val="window" lastClr="FFFFFF"/>
+      </a:lt1>
+      <a:dk2>
+        <a:srgbClr val="1F497D"/>
+      </a:dk2>
+      <a:lt2>
+        <a:srgbClr val="EEECE1"/>
+      </a:lt2>
+      <a:accent1>
+        <a:srgbClr val="4F81BD"/>
+      </a:accent1>
+      <a:accent2>
+        <a:srgbClr val="C0504D"/>
+      </a:accent2>
+      <a:accent3>
+        <a:srgbClr val="9BBB59"/>
+      </a:accent3>
+      <a:accent4>
+        <a:srgbClr val="8064A2"/>
+      </a:accent4>
+      <a:accent5>
+        <a:srgbClr val="4BACC6"/>
+      </a:accent5>
+      <a:accent6>
+        <a:srgbClr val="F79646"/>
+      </a:accent6>
+      <a:hlink>
+        <a:srgbClr val="0000FF"/>
+      </a:hlink>
+      <a:folHlink>
+        <a:srgbClr val="800080"/>
+      </a:folHlink>
+    </a:clrScheme>
+    <a:fontScheme name="Office">
+      <a:majorFont>
+        <a:latin typeface="Calibri"/>
+        <a:ea typeface=""/>
+        <a:cs typeface=""/>
+        <a:font script="Jpan" typeface="ＭＳ Ｐゴシック"/>
+        <a:font script="Hang" typeface="맑은 고딕"/>
+        <a:font script="Hans" typeface="宋体"/>
+        <a:font script="Hant" typeface="新細明體"/>
+        <a:font script="Arab" typeface="Times New Roman"/>
+        <a:font script="Hebr" typeface="Times New Roman"/>
+        <a:font script="Thai" typeface="Angsana New"/>
+        <a:font script="Ethi" typeface="Nyala"/>
+        <a:font script="Beng" typeface="Vrinda"/>
+        <a:font script="Gujr" typeface="Shruti"/>
+        <a:font script="Khmr" typeface="MoolBoran"/>
+        <a:font script="Knda" typeface="Tunga"/>
+        <a:font script="Guru" typeface="Raavi"/>
+        <a:font script="Cans" typeface="Euphemia"/>
+        <a:font script="Cher" typeface="Plantagenet Cherokee"/>
+        <a:font script="Yiii" typeface="Microsoft Yi Baiti"/>
+        <a:font script="Tibt" typeface="Microsoft Himalaya"/>
+        <a:font script="Thaa" typeface="MV Boli"/>
+        <a:font script="Deva" typeface="Mangal"/>
+        <a:font script="Telu" typeface="Gautami"/>
+        <a:font script="Taml" typeface="Latha"/>
+        <a:font script="Syrc" typeface="Estrangelo Edessa"/>
+        <a:font script="Orya" typeface="Kalinga"/>
+        <a:font script="Mlym" typeface="Kartika"/>
+        <a:font script="Laoo" typeface="DokChampa"/>
+        <a:font script="Sinh" typeface="Iskoola Pota"/>
+        <a:font script="Mong" typeface="Mongolian Baiti"/>
+        <a:font script="Viet" typeface="Times New Roman"/>
+        <a:font script="Uigh" typeface="Microsoft Uighur"/>
+        <a:font script="Geor" typeface="Sylfaen"/>
+      </a:majorFont>
+      <a:minorFont>
+        <a:latin typeface="Calibri"/>
+        <a:ea typeface=""/>
+        <a:cs typeface=""/>
+        <a:font script="Jpan" typeface="ＭＳ Ｐゴシック"/>
+        <a:font script="Hang" typeface="맑은 고딕"/>
+        <a:font script="Hans" typeface="宋体"/>
+        <a:font script="Hant" typeface="新細明體"/>
+        <a:font script="Arab" typeface="Arial"/>
+        <a:font script="Hebr" typeface="Arial"/>
+        <a:font script="Thai" typeface="Cordia New"/>
+        <a:font script="Ethi" typeface="Nyala"/>
+        <a:font script="Beng" typeface="Vrinda"/>
+        <a:font script="Gujr" typeface="Shruti"/>
+        <a:font script="Khmr" typeface="DaunPenh"/>
+        <a:font script="Knda" typeface="Tunga"/>
+        <a:font script="Guru" typeface="Raavi"/>
+        <a:font script="Cans" typeface="Euphemia"/>
+        <a:font script="Cher" typeface="Plantagenet Cherokee"/>
+        <a:font script="Yiii" typeface="Microsoft Yi Baiti"/>
+        <a:font script="Tibt" typeface="Microsoft Himalaya"/>
+        <a:font script="Thaa" typeface="MV Boli"/>
+        <a:font script="Deva" typeface="Mangal"/>
+        <a:font script="Telu" typeface="Gautami"/>
+        <a:font script="Taml" typeface="Latha"/>
+        <a:font script="Syrc" typeface="Estrangelo Edessa"/>
+        <a:font script="Orya" typeface="Kalinga"/>
+        <a:font script="Mlym" typeface="Kartika"/>
+        <a:font script="Laoo" typeface="DokChampa"/>
+        <a:font script="Sinh" typeface="Iskoola Pota"/>
+        <a:font script="Mong" typeface="Mongolian Baiti"/>
+        <a:font script="Viet" typeface="Arial"/>
+        <a:font script="Uigh" typeface="Microsoft Uighur"/>
+        <a:font script="Geor" typeface="Sylfaen"/>
+      </a:minorFont>
+    </a:fontScheme>
+    <a:fmtScheme name="Office">
+      <a:fillStyleLst>
+        <a:solidFill>
+          <a:schemeClr val="phClr"/>
+        </a:solidFill>
+        <a:gradFill rotWithShape="1">
+          <a:gsLst>
+            <a:gs pos="0">
+              <a:schemeClr val="phClr">
+                <a:tint val="50000"/>
+                <a:satMod val="300000"/>
+              </a:schemeClr>
+            </a:gs>
+            <a:gs pos="35000">
+              <a:schemeClr val="phClr">
+                <a:tint val="37000"/>
+                <a:satMod val="300000"/>
+              </a:schemeClr>
+            </a:gs>
+            <a:gs pos="100000">
+              <a:schemeClr val="phClr">
+                <a:tint val="15000"/>
+                <a:satMod val="350000"/>
+              </a:schemeClr>
+            </a:gs>
+          </a:gsLst>
+          <a:lin ang="16200000" scaled="1"/>
+        </a:gradFill>
+        <a:gradFill rotWithShape="1">
+          <a:gsLst>
+            <a:gs pos="0">
+              <a:schemeClr val="phClr">
+                <a:shade val="51000"/>
+                <a:satMod val="130000"/>
+              </a:schemeClr>
+            </a:gs>
+            <a:gs pos="80000">
+              <a:schemeClr val="phClr">
+                <a:shade val="93000"/>
+                <a:satMod val="130000"/>
+              </a:schemeClr>
+            </a:gs>
+            <a:gs pos="100000">
+              <a:schemeClr val="phClr">
+                <a:shade val="94000"/>
+                <a:satMod val="135000"/>
+              </a:schemeClr>
+            </a:gs>
+          </a:gsLst>
+          <a:lin ang="16200000" scaled="0"/>
+        </a:gradFill>
+      </a:fillStyleLst>
+      <a:lnStyleLst>
+        <a:ln w="9525" cap="flat" cmpd="sng" algn="ctr">
+          <a:solidFill>
+            <a:schemeClr val="phClr">
+              <a:shade val="95000"/>
+              <a:satMod val="105000"/>
+            </a:schemeClr>
+          </a:solidFill>
+          <a:prstDash val="solid"/>
+        </a:ln>
+        <a:ln w="25400" cap="flat" cmpd="sng" algn="ctr">
+          <a:solidFill>
+            <a:schemeClr val="phClr"/>
+          </a:solidFill>
+          <a:prstDash val="solid"/>
+        </a:ln>
+        <a:ln w="38100" cap="flat" cmpd="sng" algn="ctr">
+          <a:solidFill>
+            <a:schemeClr val="phClr"/>
+          </a:solidFill>
+          <a:prstDash val="solid"/>
+        </a:ln>
+      </a:lnStyleLst>
+      <a:effectStyleLst>
+        <a:effectStyle>
+          <a:effectLst>
+            <a:outerShdw blurRad="40000" dist="20000" dir="5400000" rotWithShape="0">
+              <a:srgbClr val="000000">
+                <a:alpha val="38000"/>
+              </a:srgbClr>
+            </a:outerShdw>
+          </a:effectLst>
+        </a:effectStyle>
+        <a:effectStyle>
+          <a:effectLst>
+            <a:outerShdw blurRad="40000" dist="23000" dir="5400000" rotWithShape="0">
+              <a:srgbClr val="000000">
+                <a:alpha val="35000"/>
+              </a:srgbClr>
+            </a:outerShdw>
+          </a:effectLst>
+        </a:effectStyle>
+        <a:effectStyle>
+          <a:effectLst>
+            <a:outerShdw blurRad="40000" dist="23000" dir="5400000" rotWithShape="0">
+              <a:srgbClr val="000000">
+                <a:alpha val="35000"/>
+              </a:srgbClr>
+            </a:outerShdw>
+          </a:effectLst>
+          <a:scene3d>
+            <a:camera prst="orthographicFront">
+              <a:rot lat="0" lon="0" rev="0"/>
+            </a:camera>
+            <a:lightRig rig="threePt" dir="t">
+              <a:rot lat="0" lon="0" rev="1200000"/>
+            </a:lightRig>
+          </a:scene3d>
+          <a:sp3d>
+            <a:bevelT w="63500" h="25400"/>
+          </a:sp3d>
+        </a:effectStyle>
+      </a:effectStyleLst>
+      <a:bgFillStyleLst>
+        <a:solidFill>
+          <a:schemeClr val="phClr"/>
+        </a:solidFill>
+        <a:gradFill rotWithShape="1">
+          <a:gsLst>
+            <a:gs pos="0">
+              <a:schemeClr val="phClr">
+                <a:tint val="40000"/>
+                <a:satMod val="350000"/>
+              </a:schemeClr>
+            </a:gs>
+            <a:gs pos="40000">
+              <a:schemeClr val="phClr">
+                <a:tint val="45000"/>
+                <a:shade val="99000"/>
+                <a:satMod val="350000"/>
+              </a:schemeClr>
+            </a:gs>
+            <a:gs pos="100000">
+              <a:schemeClr val="phClr">
+                <a:shade val="20000"/>
+                <a:satMod val="255000"/>
+              </a:schemeClr>
+            </a:gs>
+          </a:gsLst>
+          <a:path path="circle">
+            <a:fillToRect l="50000" t="-80000" r="50000" b="180000"/>
+          </a:path>
+        </a:gradFill>
+        <a:gradFill rotWithShape="1">
+          <a:gsLst>
+            <a:gs pos="0">
+              <a:schemeClr val="phClr">
+                <a:tint val="80000"/>
+                <a:satMod val="300000"/>
+              </a:schemeClr>
+            </a:gs>
+            <a:gs pos="100000">
+              <a:schemeClr val="phClr">
+                <a:shade val="30000"/>
+                <a:satMod val="200000"/>
+              </a:schemeClr>
+            </a:gs>
+          </a:gsLst>
+          <a:path path="circle">
+            <a:fillToRect l="50000" t="50000" r="50000" b="50000"/>
+          </a:path>
+        </a:gradFill>
+      </a:bgFillStyleLst>
+    </a:fmtScheme>
+  </a:themeElements>
+  <a:objectDefaults/>
+  <a:extraClrSchemeLst/>
+</a:theme>
 </file>
</xml_diff>

<commit_message>
updated files for milestone 2
</commit_message>
<xml_diff>
--- a/other/StoryBoardAllie.pptx
+++ b/other/StoryBoardAllie.pptx
@@ -7,6 +7,9 @@
   <p:notesMasterIdLst>
     <p:notesMasterId r:id="rId10"/>
   </p:notesMasterIdLst>
+  <p:handoutMasterIdLst>
+    <p:handoutMasterId r:id="rId11"/>
+  </p:handoutMasterIdLst>
   <p:sldIdLst>
     <p:sldId id="258" r:id="rId2"/>
     <p:sldId id="260" r:id="rId3"/>
@@ -18,7 +21,7 @@
     <p:sldId id="265" r:id="rId9"/>
   </p:sldIdLst>
   <p:sldSz cx="9144000" cy="6858000" type="screen4x3"/>
-  <p:notesSz cx="6858000" cy="9144000"/>
+  <p:notesSz cx="7315200" cy="9601200"/>
   <p:defaultTextStyle>
     <a:defPPr>
       <a:defRPr lang="en-US"/>
@@ -117,6 +120,171 @@
 </p:presentation>
 </file>
 
+<file path=ppt/handoutMasters/handoutMaster1.xml><?xml version="1.0" encoding="utf-8"?>
+<p:handoutMaster xmlns:a="http://schemas.openxmlformats.org/drawingml/2006/main" xmlns:r="http://schemas.openxmlformats.org/officeDocument/2006/relationships" xmlns:p="http://schemas.openxmlformats.org/presentationml/2006/main">
+  <p:cSld>
+    <p:bg>
+      <p:bgRef idx="1001">
+        <a:schemeClr val="bg1"/>
+      </p:bgRef>
+    </p:bg>
+    <p:spTree>
+      <p:nvGrpSpPr>
+        <p:cNvPr id="1" name=""/>
+        <p:cNvGrpSpPr/>
+        <p:nvPr/>
+      </p:nvGrpSpPr>
+      <p:grpSpPr>
+        <a:xfrm>
+          <a:off x="0" y="0"/>
+          <a:ext cx="0" cy="0"/>
+          <a:chOff x="0" y="0"/>
+          <a:chExt cx="0" cy="0"/>
+        </a:xfrm>
+      </p:grpSpPr>
+      <p:sp>
+        <p:nvSpPr>
+          <p:cNvPr id="2" name="Header Placeholder 1"/>
+          <p:cNvSpPr>
+            <a:spLocks noGrp="1"/>
+          </p:cNvSpPr>
+          <p:nvPr>
+            <p:ph type="hdr" sz="quarter"/>
+          </p:nvPr>
+        </p:nvSpPr>
+        <p:spPr>
+          <a:xfrm>
+            <a:off x="0" y="0"/>
+            <a:ext cx="3170238" cy="479425"/>
+          </a:xfrm>
+          <a:prstGeom prst="rect">
+            <a:avLst/>
+          </a:prstGeom>
+        </p:spPr>
+        <p:txBody>
+          <a:bodyPr vert="horz" lIns="91440" tIns="45720" rIns="91440" bIns="45720" rtlCol="0"/>
+          <a:lstStyle>
+            <a:lvl1pPr algn="l">
+              <a:defRPr sz="1200"/>
+            </a:lvl1pPr>
+          </a:lstStyle>
+          <a:p>
+            <a:endParaRPr lang="en-US"/>
+          </a:p>
+        </p:txBody>
+      </p:sp>
+      <p:sp>
+        <p:nvSpPr>
+          <p:cNvPr id="3" name="Date Placeholder 2"/>
+          <p:cNvSpPr>
+            <a:spLocks noGrp="1"/>
+          </p:cNvSpPr>
+          <p:nvPr>
+            <p:ph type="dt" sz="quarter" idx="1"/>
+          </p:nvPr>
+        </p:nvSpPr>
+        <p:spPr>
+          <a:xfrm>
+            <a:off x="4143375" y="0"/>
+            <a:ext cx="3170238" cy="479425"/>
+          </a:xfrm>
+          <a:prstGeom prst="rect">
+            <a:avLst/>
+          </a:prstGeom>
+        </p:spPr>
+        <p:txBody>
+          <a:bodyPr vert="horz" lIns="91440" tIns="45720" rIns="91440" bIns="45720" rtlCol="0"/>
+          <a:lstStyle>
+            <a:lvl1pPr algn="r">
+              <a:defRPr sz="1200"/>
+            </a:lvl1pPr>
+          </a:lstStyle>
+          <a:p>
+            <a:fld id="{DC1A2B70-BC05-4365-A7A1-CB07693BD8FA}" type="datetimeFigureOut">
+              <a:rPr lang="en-US" smtClean="0"/>
+              <a:t>10/4/2011</a:t>
+            </a:fld>
+            <a:endParaRPr lang="en-US"/>
+          </a:p>
+        </p:txBody>
+      </p:sp>
+      <p:sp>
+        <p:nvSpPr>
+          <p:cNvPr id="4" name="Footer Placeholder 3"/>
+          <p:cNvSpPr>
+            <a:spLocks noGrp="1"/>
+          </p:cNvSpPr>
+          <p:nvPr>
+            <p:ph type="ftr" sz="quarter" idx="2"/>
+          </p:nvPr>
+        </p:nvSpPr>
+        <p:spPr>
+          <a:xfrm>
+            <a:off x="0" y="9120188"/>
+            <a:ext cx="3170238" cy="479425"/>
+          </a:xfrm>
+          <a:prstGeom prst="rect">
+            <a:avLst/>
+          </a:prstGeom>
+        </p:spPr>
+        <p:txBody>
+          <a:bodyPr vert="horz" lIns="91440" tIns="45720" rIns="91440" bIns="45720" rtlCol="0" anchor="b"/>
+          <a:lstStyle>
+            <a:lvl1pPr algn="l">
+              <a:defRPr sz="1200"/>
+            </a:lvl1pPr>
+          </a:lstStyle>
+          <a:p>
+            <a:endParaRPr lang="en-US"/>
+          </a:p>
+        </p:txBody>
+      </p:sp>
+      <p:sp>
+        <p:nvSpPr>
+          <p:cNvPr id="5" name="Slide Number Placeholder 4"/>
+          <p:cNvSpPr>
+            <a:spLocks noGrp="1"/>
+          </p:cNvSpPr>
+          <p:nvPr>
+            <p:ph type="sldNum" sz="quarter" idx="3"/>
+          </p:nvPr>
+        </p:nvSpPr>
+        <p:spPr>
+          <a:xfrm>
+            <a:off x="4143375" y="9120188"/>
+            <a:ext cx="3170238" cy="479425"/>
+          </a:xfrm>
+          <a:prstGeom prst="rect">
+            <a:avLst/>
+          </a:prstGeom>
+        </p:spPr>
+        <p:txBody>
+          <a:bodyPr vert="horz" lIns="91440" tIns="45720" rIns="91440" bIns="45720" rtlCol="0" anchor="b"/>
+          <a:lstStyle>
+            <a:lvl1pPr algn="r">
+              <a:defRPr sz="1200"/>
+            </a:lvl1pPr>
+          </a:lstStyle>
+          <a:p>
+            <a:fld id="{E4636FAF-470E-42B8-A7C4-57E2BF967C64}" type="slidenum">
+              <a:rPr lang="en-US" smtClean="0"/>
+              <a:t>‹#›</a:t>
+            </a:fld>
+            <a:endParaRPr lang="en-US"/>
+          </a:p>
+        </p:txBody>
+      </p:sp>
+    </p:spTree>
+    <p:extLst>
+      <p:ext uri="{BB962C8B-B14F-4D97-AF65-F5344CB8AC3E}">
+        <p14:creationId xmlns:p14="http://schemas.microsoft.com/office/powerpoint/2010/main" val="3768723226"/>
+      </p:ext>
+    </p:extLst>
+  </p:cSld>
+  <p:clrMap bg1="lt1" tx1="dk1" bg2="lt2" tx2="dk2" accent1="accent1" accent2="accent2" accent3="accent3" accent4="accent4" accent5="accent5" accent6="accent6" hlink="hlink" folHlink="folHlink"/>
+</p:handoutMaster>
+</file>
+
 <file path=ppt/notesMasters/notesMaster1.xml><?xml version="1.0" encoding="utf-8"?>
 <p:notesMaster xmlns:a="http://schemas.openxmlformats.org/drawingml/2006/main" xmlns:r="http://schemas.openxmlformats.org/officeDocument/2006/relationships" xmlns:p="http://schemas.openxmlformats.org/presentationml/2006/main">
   <p:cSld>
@@ -152,17 +320,17 @@
         <p:spPr>
           <a:xfrm>
             <a:off x="0" y="0"/>
-            <a:ext cx="2971800" cy="457200"/>
+            <a:ext cx="3169920" cy="480060"/>
           </a:xfrm>
           <a:prstGeom prst="rect">
             <a:avLst/>
           </a:prstGeom>
         </p:spPr>
         <p:txBody>
-          <a:bodyPr vert="horz" lIns="91440" tIns="45720" rIns="91440" bIns="45720" rtlCol="0"/>
+          <a:bodyPr vert="horz" lIns="96661" tIns="48331" rIns="96661" bIns="48331" rtlCol="0"/>
           <a:lstStyle>
             <a:lvl1pPr algn="l">
-              <a:defRPr sz="1200"/>
+              <a:defRPr sz="1300"/>
             </a:lvl1pPr>
           </a:lstStyle>
           <a:p>
@@ -182,24 +350,24 @@
         </p:nvSpPr>
         <p:spPr>
           <a:xfrm>
-            <a:off x="3884613" y="0"/>
-            <a:ext cx="2971800" cy="457200"/>
+            <a:off x="4143587" y="0"/>
+            <a:ext cx="3169920" cy="480060"/>
           </a:xfrm>
           <a:prstGeom prst="rect">
             <a:avLst/>
           </a:prstGeom>
         </p:spPr>
         <p:txBody>
-          <a:bodyPr vert="horz" lIns="91440" tIns="45720" rIns="91440" bIns="45720" rtlCol="0"/>
+          <a:bodyPr vert="horz" lIns="96661" tIns="48331" rIns="96661" bIns="48331" rtlCol="0"/>
           <a:lstStyle>
             <a:lvl1pPr algn="r">
-              <a:defRPr sz="1200"/>
+              <a:defRPr sz="1300"/>
             </a:lvl1pPr>
           </a:lstStyle>
           <a:p>
             <a:fld id="{0F82D136-5890-4D2D-B4B5-B44F52F0702C}" type="datetimeFigureOut">
               <a:rPr lang="en-US" smtClean="0"/>
-              <a:t>9/25/2011</a:t>
+              <a:t>10/4/2011</a:t>
             </a:fld>
             <a:endParaRPr lang="en-US"/>
           </a:p>
@@ -217,8 +385,8 @@
         </p:nvSpPr>
         <p:spPr>
           <a:xfrm>
-            <a:off x="1143000" y="685800"/>
-            <a:ext cx="4572000" cy="3429000"/>
+            <a:off x="1257300" y="720725"/>
+            <a:ext cx="4800600" cy="3600450"/>
           </a:xfrm>
           <a:prstGeom prst="rect">
             <a:avLst/>
@@ -231,7 +399,7 @@
           </a:ln>
         </p:spPr>
         <p:txBody>
-          <a:bodyPr vert="horz" lIns="91440" tIns="45720" rIns="91440" bIns="45720" rtlCol="0" anchor="ctr"/>
+          <a:bodyPr vert="horz" lIns="96661" tIns="48331" rIns="96661" bIns="48331" rtlCol="0" anchor="ctr"/>
           <a:lstStyle/>
           <a:p>
             <a:endParaRPr lang="en-US"/>
@@ -250,15 +418,15 @@
         </p:nvSpPr>
         <p:spPr>
           <a:xfrm>
-            <a:off x="685800" y="4343400"/>
-            <a:ext cx="5486400" cy="4114800"/>
+            <a:off x="731520" y="4560570"/>
+            <a:ext cx="5852160" cy="4320540"/>
           </a:xfrm>
           <a:prstGeom prst="rect">
             <a:avLst/>
           </a:prstGeom>
         </p:spPr>
         <p:txBody>
-          <a:bodyPr vert="horz" lIns="91440" tIns="45720" rIns="91440" bIns="45720" rtlCol="0"/>
+          <a:bodyPr vert="horz" lIns="96661" tIns="48331" rIns="96661" bIns="48331" rtlCol="0"/>
           <a:lstStyle/>
           <a:p>
             <a:pPr lvl="0"/>
@@ -310,18 +478,18 @@
         </p:nvSpPr>
         <p:spPr>
           <a:xfrm>
-            <a:off x="0" y="8685213"/>
-            <a:ext cx="2971800" cy="457200"/>
+            <a:off x="0" y="9119474"/>
+            <a:ext cx="3169920" cy="480060"/>
           </a:xfrm>
           <a:prstGeom prst="rect">
             <a:avLst/>
           </a:prstGeom>
         </p:spPr>
         <p:txBody>
-          <a:bodyPr vert="horz" lIns="91440" tIns="45720" rIns="91440" bIns="45720" rtlCol="0" anchor="b"/>
+          <a:bodyPr vert="horz" lIns="96661" tIns="48331" rIns="96661" bIns="48331" rtlCol="0" anchor="b"/>
           <a:lstStyle>
             <a:lvl1pPr algn="l">
-              <a:defRPr sz="1200"/>
+              <a:defRPr sz="1300"/>
             </a:lvl1pPr>
           </a:lstStyle>
           <a:p>
@@ -341,18 +509,18 @@
         </p:nvSpPr>
         <p:spPr>
           <a:xfrm>
-            <a:off x="3884613" y="8685213"/>
-            <a:ext cx="2971800" cy="457200"/>
+            <a:off x="4143587" y="9119474"/>
+            <a:ext cx="3169920" cy="480060"/>
           </a:xfrm>
           <a:prstGeom prst="rect">
             <a:avLst/>
           </a:prstGeom>
         </p:spPr>
         <p:txBody>
-          <a:bodyPr vert="horz" lIns="91440" tIns="45720" rIns="91440" bIns="45720" rtlCol="0" anchor="b"/>
+          <a:bodyPr vert="horz" lIns="96661" tIns="48331" rIns="96661" bIns="48331" rtlCol="0" anchor="b"/>
           <a:lstStyle>
             <a:lvl1pPr algn="r">
-              <a:defRPr sz="1200"/>
+              <a:defRPr sz="1300"/>
             </a:lvl1pPr>
           </a:lstStyle>
           <a:p>
@@ -513,16 +681,8 @@
           <a:p>
             <a:r>
               <a:rPr lang="en-US" dirty="0" smtClean="0"/>
-              <a:t>List dates</a:t>
-            </a:r>
-          </a:p>
-          <a:p>
-            <a:r>
-              <a:rPr lang="en-US" dirty="0" smtClean="0"/>
-              <a:t>Who is running it</a:t>
-            </a:r>
-          </a:p>
-          <a:p>
+              <a:t>From Here a user would select the date block of the experiment they wanted to sign up for.</a:t>
+            </a:r>
             <a:endParaRPr lang="en-US" dirty="0"/>
           </a:p>
         </p:txBody>
@@ -544,7 +704,7 @@
           <a:p>
             <a:fld id="{D5051250-98A1-4263-9E5A-72FCEE9F94B2}" type="slidenum">
               <a:rPr lang="en-US" smtClean="0"/>
-              <a:t>2</a:t>
+              <a:t>1</a:t>
             </a:fld>
             <a:endParaRPr lang="en-US"/>
           </a:p>
@@ -553,7 +713,7 @@
     </p:spTree>
     <p:extLst>
       <p:ext uri="{BB962C8B-B14F-4D97-AF65-F5344CB8AC3E}">
-        <p14:creationId xmlns:p14="http://schemas.microsoft.com/office/powerpoint/2010/main" val="2850259698"/>
+        <p14:creationId xmlns:p14="http://schemas.microsoft.com/office/powerpoint/2010/main" val="4007884554"/>
       </p:ext>
     </p:extLst>
   </p:cSld>
@@ -609,7 +769,11 @@
           <a:p>
             <a:r>
               <a:rPr lang="en-US" dirty="0" smtClean="0"/>
-              <a:t>Add “EULA” type consent</a:t>
+              <a:t>This</a:t>
+            </a:r>
+            <a:r>
+              <a:rPr lang="en-US" baseline="0" dirty="0" smtClean="0"/>
+              <a:t> screen shows the experiment qualifications, the Dates and times of the experiment, what researcher is running the experiment, a section for notes and also a link to sign up for the experiment.  A user would review the information and hopefully sign up.</a:t>
             </a:r>
             <a:endParaRPr lang="en-US" dirty="0"/>
           </a:p>
@@ -632,7 +796,7 @@
           <a:p>
             <a:fld id="{D5051250-98A1-4263-9E5A-72FCEE9F94B2}" type="slidenum">
               <a:rPr lang="en-US" smtClean="0"/>
-              <a:t>3</a:t>
+              <a:t>2</a:t>
             </a:fld>
             <a:endParaRPr lang="en-US"/>
           </a:p>
@@ -641,7 +805,7 @@
     </p:spTree>
     <p:extLst>
       <p:ext uri="{BB962C8B-B14F-4D97-AF65-F5344CB8AC3E}">
-        <p14:creationId xmlns:p14="http://schemas.microsoft.com/office/powerpoint/2010/main" val="2048539117"/>
+        <p14:creationId xmlns:p14="http://schemas.microsoft.com/office/powerpoint/2010/main" val="2850259698"/>
       </p:ext>
     </p:extLst>
   </p:cSld>
@@ -697,7 +861,11 @@
           <a:p>
             <a:r>
               <a:rPr lang="en-US" dirty="0" smtClean="0"/>
-              <a:t>Table based</a:t>
+              <a:t>This</a:t>
+            </a:r>
+            <a:r>
+              <a:rPr lang="en-US" baseline="0" dirty="0" smtClean="0"/>
+              <a:t> screen allows a participant to sign up for the experiment and agree to meet all the qualifications.</a:t>
             </a:r>
             <a:endParaRPr lang="en-US" dirty="0"/>
           </a:p>
@@ -720,7 +888,7 @@
           <a:p>
             <a:fld id="{D5051250-98A1-4263-9E5A-72FCEE9F94B2}" type="slidenum">
               <a:rPr lang="en-US" smtClean="0"/>
-              <a:t>5</a:t>
+              <a:t>3</a:t>
             </a:fld>
             <a:endParaRPr lang="en-US"/>
           </a:p>
@@ -729,7 +897,7 @@
     </p:spTree>
     <p:extLst>
       <p:ext uri="{BB962C8B-B14F-4D97-AF65-F5344CB8AC3E}">
-        <p14:creationId xmlns:p14="http://schemas.microsoft.com/office/powerpoint/2010/main" val="3683699227"/>
+        <p14:creationId xmlns:p14="http://schemas.microsoft.com/office/powerpoint/2010/main" val="2048539117"/>
       </p:ext>
     </p:extLst>
   </p:cSld>
@@ -785,13 +953,195 @@
           <a:p>
             <a:r>
               <a:rPr lang="en-US" dirty="0" smtClean="0"/>
-              <a:t>Add Date time column</a:t>
-            </a:r>
-          </a:p>
+              <a:t>A researcher</a:t>
+            </a:r>
+            <a:r>
+              <a:rPr lang="en-US" baseline="0" dirty="0" smtClean="0"/>
+              <a:t> would log in to their account from here.</a:t>
+            </a:r>
+            <a:endParaRPr lang="en-US" dirty="0"/>
+          </a:p>
+        </p:txBody>
+      </p:sp>
+      <p:sp>
+        <p:nvSpPr>
+          <p:cNvPr id="4" name="Slide Number Placeholder 3"/>
+          <p:cNvSpPr>
+            <a:spLocks noGrp="1"/>
+          </p:cNvSpPr>
+          <p:nvPr>
+            <p:ph type="sldNum" sz="quarter" idx="10"/>
+          </p:nvPr>
+        </p:nvSpPr>
+        <p:spPr/>
+        <p:txBody>
+          <a:bodyPr/>
+          <a:lstStyle/>
+          <a:p>
+            <a:fld id="{D5051250-98A1-4263-9E5A-72FCEE9F94B2}" type="slidenum">
+              <a:rPr lang="en-US" smtClean="0"/>
+              <a:t>4</a:t>
+            </a:fld>
+            <a:endParaRPr lang="en-US"/>
+          </a:p>
+        </p:txBody>
+      </p:sp>
+    </p:spTree>
+    <p:extLst>
+      <p:ext uri="{BB962C8B-B14F-4D97-AF65-F5344CB8AC3E}">
+        <p14:creationId xmlns:p14="http://schemas.microsoft.com/office/powerpoint/2010/main" val="510440143"/>
+      </p:ext>
+    </p:extLst>
+  </p:cSld>
+  <p:clrMapOvr>
+    <a:masterClrMapping/>
+  </p:clrMapOvr>
+</p:notes>
+</file>
+
+<file path=ppt/notesSlides/notesSlide5.xml><?xml version="1.0" encoding="utf-8"?>
+<p:notes xmlns:a="http://schemas.openxmlformats.org/drawingml/2006/main" xmlns:r="http://schemas.openxmlformats.org/officeDocument/2006/relationships" xmlns:p="http://schemas.openxmlformats.org/presentationml/2006/main">
+  <p:cSld>
+    <p:spTree>
+      <p:nvGrpSpPr>
+        <p:cNvPr id="1" name=""/>
+        <p:cNvGrpSpPr/>
+        <p:nvPr/>
+      </p:nvGrpSpPr>
+      <p:grpSpPr>
+        <a:xfrm>
+          <a:off x="0" y="0"/>
+          <a:ext cx="0" cy="0"/>
+          <a:chOff x="0" y="0"/>
+          <a:chExt cx="0" cy="0"/>
+        </a:xfrm>
+      </p:grpSpPr>
+      <p:sp>
+        <p:nvSpPr>
+          <p:cNvPr id="2" name="Slide Image Placeholder 1"/>
+          <p:cNvSpPr>
+            <a:spLocks noGrp="1" noRot="1" noChangeAspect="1"/>
+          </p:cNvSpPr>
+          <p:nvPr>
+            <p:ph type="sldImg"/>
+          </p:nvPr>
+        </p:nvSpPr>
+        <p:spPr/>
+      </p:sp>
+      <p:sp>
+        <p:nvSpPr>
+          <p:cNvPr id="3" name="Notes Placeholder 2"/>
+          <p:cNvSpPr>
+            <a:spLocks noGrp="1"/>
+          </p:cNvSpPr>
+          <p:nvPr>
+            <p:ph type="body" idx="1"/>
+          </p:nvPr>
+        </p:nvSpPr>
+        <p:spPr/>
+        <p:txBody>
+          <a:bodyPr/>
+          <a:lstStyle/>
           <a:p>
             <a:r>
               <a:rPr lang="en-US" dirty="0" smtClean="0"/>
-              <a:t>Add description</a:t>
+              <a:t>A</a:t>
+            </a:r>
+            <a:r>
+              <a:rPr lang="en-US" baseline="0" dirty="0" smtClean="0"/>
+              <a:t> researcher’s possible screen after signing in.</a:t>
+            </a:r>
+            <a:endParaRPr lang="en-US" dirty="0"/>
+          </a:p>
+        </p:txBody>
+      </p:sp>
+      <p:sp>
+        <p:nvSpPr>
+          <p:cNvPr id="4" name="Slide Number Placeholder 3"/>
+          <p:cNvSpPr>
+            <a:spLocks noGrp="1"/>
+          </p:cNvSpPr>
+          <p:nvPr>
+            <p:ph type="sldNum" sz="quarter" idx="10"/>
+          </p:nvPr>
+        </p:nvSpPr>
+        <p:spPr/>
+        <p:txBody>
+          <a:bodyPr/>
+          <a:lstStyle/>
+          <a:p>
+            <a:fld id="{D5051250-98A1-4263-9E5A-72FCEE9F94B2}" type="slidenum">
+              <a:rPr lang="en-US" smtClean="0"/>
+              <a:t>5</a:t>
+            </a:fld>
+            <a:endParaRPr lang="en-US"/>
+          </a:p>
+        </p:txBody>
+      </p:sp>
+    </p:spTree>
+    <p:extLst>
+      <p:ext uri="{BB962C8B-B14F-4D97-AF65-F5344CB8AC3E}">
+        <p14:creationId xmlns:p14="http://schemas.microsoft.com/office/powerpoint/2010/main" val="3683699227"/>
+      </p:ext>
+    </p:extLst>
+  </p:cSld>
+  <p:clrMapOvr>
+    <a:masterClrMapping/>
+  </p:clrMapOvr>
+</p:notes>
+</file>
+
+<file path=ppt/notesSlides/notesSlide6.xml><?xml version="1.0" encoding="utf-8"?>
+<p:notes xmlns:a="http://schemas.openxmlformats.org/drawingml/2006/main" xmlns:r="http://schemas.openxmlformats.org/officeDocument/2006/relationships" xmlns:p="http://schemas.openxmlformats.org/presentationml/2006/main">
+  <p:cSld>
+    <p:spTree>
+      <p:nvGrpSpPr>
+        <p:cNvPr id="1" name=""/>
+        <p:cNvGrpSpPr/>
+        <p:nvPr/>
+      </p:nvGrpSpPr>
+      <p:grpSpPr>
+        <a:xfrm>
+          <a:off x="0" y="0"/>
+          <a:ext cx="0" cy="0"/>
+          <a:chOff x="0" y="0"/>
+          <a:chExt cx="0" cy="0"/>
+        </a:xfrm>
+      </p:grpSpPr>
+      <p:sp>
+        <p:nvSpPr>
+          <p:cNvPr id="2" name="Slide Image Placeholder 1"/>
+          <p:cNvSpPr>
+            <a:spLocks noGrp="1" noRot="1" noChangeAspect="1"/>
+          </p:cNvSpPr>
+          <p:nvPr>
+            <p:ph type="sldImg"/>
+          </p:nvPr>
+        </p:nvSpPr>
+        <p:spPr/>
+      </p:sp>
+      <p:sp>
+        <p:nvSpPr>
+          <p:cNvPr id="3" name="Notes Placeholder 2"/>
+          <p:cNvSpPr>
+            <a:spLocks noGrp="1"/>
+          </p:cNvSpPr>
+          <p:nvPr>
+            <p:ph type="body" idx="1"/>
+          </p:nvPr>
+        </p:nvSpPr>
+        <p:spPr/>
+        <p:txBody>
+          <a:bodyPr/>
+          <a:lstStyle/>
+          <a:p>
+            <a:r>
+              <a:rPr lang="en-US" dirty="0" smtClean="0"/>
+              <a:t>From this screen a researcher could add description</a:t>
+            </a:r>
+            <a:r>
+              <a:rPr lang="en-US" baseline="0" dirty="0" smtClean="0"/>
+              <a:t> or notes and also qualifications.  Also, the researcher could view the participants.</a:t>
             </a:r>
             <a:endParaRPr lang="en-US" dirty="0"/>
           </a:p>
@@ -824,6 +1174,186 @@
     <p:extLst>
       <p:ext uri="{BB962C8B-B14F-4D97-AF65-F5344CB8AC3E}">
         <p14:creationId xmlns:p14="http://schemas.microsoft.com/office/powerpoint/2010/main" val="1960759126"/>
+      </p:ext>
+    </p:extLst>
+  </p:cSld>
+  <p:clrMapOvr>
+    <a:masterClrMapping/>
+  </p:clrMapOvr>
+</p:notes>
+</file>
+
+<file path=ppt/notesSlides/notesSlide7.xml><?xml version="1.0" encoding="utf-8"?>
+<p:notes xmlns:a="http://schemas.openxmlformats.org/drawingml/2006/main" xmlns:r="http://schemas.openxmlformats.org/officeDocument/2006/relationships" xmlns:p="http://schemas.openxmlformats.org/presentationml/2006/main">
+  <p:cSld>
+    <p:spTree>
+      <p:nvGrpSpPr>
+        <p:cNvPr id="1" name=""/>
+        <p:cNvGrpSpPr/>
+        <p:nvPr/>
+      </p:nvGrpSpPr>
+      <p:grpSpPr>
+        <a:xfrm>
+          <a:off x="0" y="0"/>
+          <a:ext cx="0" cy="0"/>
+          <a:chOff x="0" y="0"/>
+          <a:chExt cx="0" cy="0"/>
+        </a:xfrm>
+      </p:grpSpPr>
+      <p:sp>
+        <p:nvSpPr>
+          <p:cNvPr id="2" name="Slide Image Placeholder 1"/>
+          <p:cNvSpPr>
+            <a:spLocks noGrp="1" noRot="1" noChangeAspect="1"/>
+          </p:cNvSpPr>
+          <p:nvPr>
+            <p:ph type="sldImg"/>
+          </p:nvPr>
+        </p:nvSpPr>
+        <p:spPr/>
+      </p:sp>
+      <p:sp>
+        <p:nvSpPr>
+          <p:cNvPr id="3" name="Notes Placeholder 2"/>
+          <p:cNvSpPr>
+            <a:spLocks noGrp="1"/>
+          </p:cNvSpPr>
+          <p:nvPr>
+            <p:ph type="body" idx="1"/>
+          </p:nvPr>
+        </p:nvSpPr>
+        <p:spPr/>
+        <p:txBody>
+          <a:bodyPr/>
+          <a:lstStyle/>
+          <a:p>
+            <a:r>
+              <a:rPr lang="en-US" dirty="0" smtClean="0"/>
+              <a:t>This</a:t>
+            </a:r>
+            <a:r>
+              <a:rPr lang="en-US" baseline="0" dirty="0" smtClean="0"/>
+              <a:t> screen is an alternative to the calendar view for the researchers.</a:t>
+            </a:r>
+            <a:endParaRPr lang="en-US" dirty="0"/>
+          </a:p>
+        </p:txBody>
+      </p:sp>
+      <p:sp>
+        <p:nvSpPr>
+          <p:cNvPr id="4" name="Slide Number Placeholder 3"/>
+          <p:cNvSpPr>
+            <a:spLocks noGrp="1"/>
+          </p:cNvSpPr>
+          <p:nvPr>
+            <p:ph type="sldNum" sz="quarter" idx="10"/>
+          </p:nvPr>
+        </p:nvSpPr>
+        <p:spPr/>
+        <p:txBody>
+          <a:bodyPr/>
+          <a:lstStyle/>
+          <a:p>
+            <a:fld id="{D5051250-98A1-4263-9E5A-72FCEE9F94B2}" type="slidenum">
+              <a:rPr lang="en-US" smtClean="0"/>
+              <a:t>7</a:t>
+            </a:fld>
+            <a:endParaRPr lang="en-US"/>
+          </a:p>
+        </p:txBody>
+      </p:sp>
+    </p:spTree>
+    <p:extLst>
+      <p:ext uri="{BB962C8B-B14F-4D97-AF65-F5344CB8AC3E}">
+        <p14:creationId xmlns:p14="http://schemas.microsoft.com/office/powerpoint/2010/main" val="3853698493"/>
+      </p:ext>
+    </p:extLst>
+  </p:cSld>
+  <p:clrMapOvr>
+    <a:masterClrMapping/>
+  </p:clrMapOvr>
+</p:notes>
+</file>
+
+<file path=ppt/notesSlides/notesSlide8.xml><?xml version="1.0" encoding="utf-8"?>
+<p:notes xmlns:a="http://schemas.openxmlformats.org/drawingml/2006/main" xmlns:r="http://schemas.openxmlformats.org/officeDocument/2006/relationships" xmlns:p="http://schemas.openxmlformats.org/presentationml/2006/main">
+  <p:cSld>
+    <p:spTree>
+      <p:nvGrpSpPr>
+        <p:cNvPr id="1" name=""/>
+        <p:cNvGrpSpPr/>
+        <p:nvPr/>
+      </p:nvGrpSpPr>
+      <p:grpSpPr>
+        <a:xfrm>
+          <a:off x="0" y="0"/>
+          <a:ext cx="0" cy="0"/>
+          <a:chOff x="0" y="0"/>
+          <a:chExt cx="0" cy="0"/>
+        </a:xfrm>
+      </p:grpSpPr>
+      <p:sp>
+        <p:nvSpPr>
+          <p:cNvPr id="2" name="Slide Image Placeholder 1"/>
+          <p:cNvSpPr>
+            <a:spLocks noGrp="1" noRot="1" noChangeAspect="1"/>
+          </p:cNvSpPr>
+          <p:nvPr>
+            <p:ph type="sldImg"/>
+          </p:nvPr>
+        </p:nvSpPr>
+        <p:spPr/>
+      </p:sp>
+      <p:sp>
+        <p:nvSpPr>
+          <p:cNvPr id="3" name="Notes Placeholder 2"/>
+          <p:cNvSpPr>
+            <a:spLocks noGrp="1"/>
+          </p:cNvSpPr>
+          <p:nvPr>
+            <p:ph type="body" idx="1"/>
+          </p:nvPr>
+        </p:nvSpPr>
+        <p:spPr/>
+        <p:txBody>
+          <a:bodyPr/>
+          <a:lstStyle/>
+          <a:p>
+            <a:r>
+              <a:rPr lang="en-US" dirty="0" smtClean="0"/>
+              <a:t>This screen is an alternative to the calendar view for the participants.</a:t>
+            </a:r>
+            <a:endParaRPr lang="en-US" dirty="0"/>
+          </a:p>
+        </p:txBody>
+      </p:sp>
+      <p:sp>
+        <p:nvSpPr>
+          <p:cNvPr id="4" name="Slide Number Placeholder 3"/>
+          <p:cNvSpPr>
+            <a:spLocks noGrp="1"/>
+          </p:cNvSpPr>
+          <p:nvPr>
+            <p:ph type="sldNum" sz="quarter" idx="10"/>
+          </p:nvPr>
+        </p:nvSpPr>
+        <p:spPr/>
+        <p:txBody>
+          <a:bodyPr/>
+          <a:lstStyle/>
+          <a:p>
+            <a:fld id="{D5051250-98A1-4263-9E5A-72FCEE9F94B2}" type="slidenum">
+              <a:rPr lang="en-US" smtClean="0"/>
+              <a:t>8</a:t>
+            </a:fld>
+            <a:endParaRPr lang="en-US"/>
+          </a:p>
+        </p:txBody>
+      </p:sp>
+    </p:spTree>
+    <p:extLst>
+      <p:ext uri="{BB962C8B-B14F-4D97-AF65-F5344CB8AC3E}">
+        <p14:creationId xmlns:p14="http://schemas.microsoft.com/office/powerpoint/2010/main" val="731369518"/>
       </p:ext>
     </p:extLst>
   </p:cSld>
@@ -1014,7 +1544,7 @@
           <a:p>
             <a:fld id="{0CFE0260-2AF6-4D88-BE87-C1C9B7FA407A}" type="datetimeFigureOut">
               <a:rPr lang="en-US" smtClean="0"/>
-              <a:t>9/25/2011</a:t>
+              <a:t>10/4/2011</a:t>
             </a:fld>
             <a:endParaRPr lang="en-US"/>
           </a:p>
@@ -1184,7 +1714,7 @@
           <a:p>
             <a:fld id="{0CFE0260-2AF6-4D88-BE87-C1C9B7FA407A}" type="datetimeFigureOut">
               <a:rPr lang="en-US" smtClean="0"/>
-              <a:t>9/25/2011</a:t>
+              <a:t>10/4/2011</a:t>
             </a:fld>
             <a:endParaRPr lang="en-US"/>
           </a:p>
@@ -1364,7 +1894,7 @@
           <a:p>
             <a:fld id="{0CFE0260-2AF6-4D88-BE87-C1C9B7FA407A}" type="datetimeFigureOut">
               <a:rPr lang="en-US" smtClean="0"/>
-              <a:t>9/25/2011</a:t>
+              <a:t>10/4/2011</a:t>
             </a:fld>
             <a:endParaRPr lang="en-US"/>
           </a:p>
@@ -1534,7 +2064,7 @@
           <a:p>
             <a:fld id="{0CFE0260-2AF6-4D88-BE87-C1C9B7FA407A}" type="datetimeFigureOut">
               <a:rPr lang="en-US" smtClean="0"/>
-              <a:t>9/25/2011</a:t>
+              <a:t>10/4/2011</a:t>
             </a:fld>
             <a:endParaRPr lang="en-US"/>
           </a:p>
@@ -1780,7 +2310,7 @@
           <a:p>
             <a:fld id="{0CFE0260-2AF6-4D88-BE87-C1C9B7FA407A}" type="datetimeFigureOut">
               <a:rPr lang="en-US" smtClean="0"/>
-              <a:t>9/25/2011</a:t>
+              <a:t>10/4/2011</a:t>
             </a:fld>
             <a:endParaRPr lang="en-US"/>
           </a:p>
@@ -2068,7 +2598,7 @@
           <a:p>
             <a:fld id="{0CFE0260-2AF6-4D88-BE87-C1C9B7FA407A}" type="datetimeFigureOut">
               <a:rPr lang="en-US" smtClean="0"/>
-              <a:t>9/25/2011</a:t>
+              <a:t>10/4/2011</a:t>
             </a:fld>
             <a:endParaRPr lang="en-US"/>
           </a:p>
@@ -2490,7 +3020,7 @@
           <a:p>
             <a:fld id="{0CFE0260-2AF6-4D88-BE87-C1C9B7FA407A}" type="datetimeFigureOut">
               <a:rPr lang="en-US" smtClean="0"/>
-              <a:t>9/25/2011</a:t>
+              <a:t>10/4/2011</a:t>
             </a:fld>
             <a:endParaRPr lang="en-US"/>
           </a:p>
@@ -2608,7 +3138,7 @@
           <a:p>
             <a:fld id="{0CFE0260-2AF6-4D88-BE87-C1C9B7FA407A}" type="datetimeFigureOut">
               <a:rPr lang="en-US" smtClean="0"/>
-              <a:t>9/25/2011</a:t>
+              <a:t>10/4/2011</a:t>
             </a:fld>
             <a:endParaRPr lang="en-US"/>
           </a:p>
@@ -2703,7 +3233,7 @@
           <a:p>
             <a:fld id="{0CFE0260-2AF6-4D88-BE87-C1C9B7FA407A}" type="datetimeFigureOut">
               <a:rPr lang="en-US" smtClean="0"/>
-              <a:t>9/25/2011</a:t>
+              <a:t>10/4/2011</a:t>
             </a:fld>
             <a:endParaRPr lang="en-US"/>
           </a:p>
@@ -2980,7 +3510,7 @@
           <a:p>
             <a:fld id="{0CFE0260-2AF6-4D88-BE87-C1C9B7FA407A}" type="datetimeFigureOut">
               <a:rPr lang="en-US" smtClean="0"/>
-              <a:t>9/25/2011</a:t>
+              <a:t>10/4/2011</a:t>
             </a:fld>
             <a:endParaRPr lang="en-US"/>
           </a:p>
@@ -3233,7 +3763,7 @@
           <a:p>
             <a:fld id="{0CFE0260-2AF6-4D88-BE87-C1C9B7FA407A}" type="datetimeFigureOut">
               <a:rPr lang="en-US" smtClean="0"/>
-              <a:t>9/25/2011</a:t>
+              <a:t>10/4/2011</a:t>
             </a:fld>
             <a:endParaRPr lang="en-US"/>
           </a:p>
@@ -3446,7 +3976,7 @@
           <a:p>
             <a:fld id="{0CFE0260-2AF6-4D88-BE87-C1C9B7FA407A}" type="datetimeFigureOut">
               <a:rPr lang="en-US" smtClean="0"/>
-              <a:t>9/25/2011</a:t>
+              <a:t>10/4/2011</a:t>
             </a:fld>
             <a:endParaRPr lang="en-US"/>
           </a:p>
@@ -3864,7 +4394,7 @@
       <p:pic>
         <p:nvPicPr>
           <p:cNvPr id="1026" name="Picture 2" descr="C:\Users\cahilltr\Desktop\Schedule.png">
-            <a:hlinkClick r:id="rId2" action="ppaction://hlinksldjump"/>
+            <a:hlinkClick r:id="rId3" action="ppaction://hlinksldjump"/>
           </p:cNvPr>
           <p:cNvPicPr>
             <a:picLocks noChangeAspect="1" noChangeArrowheads="1"/>
@@ -3872,7 +4402,7 @@
           <p:nvPr/>
         </p:nvPicPr>
         <p:blipFill>
-          <a:blip r:embed="rId3" cstate="print">
+          <a:blip r:embed="rId4" cstate="print">
             <a:extLst>
               <a:ext uri="{28A0092B-C50C-407E-A947-70E740481C1C}">
                 <a14:useLocalDpi xmlns:a14="http://schemas.microsoft.com/office/drawing/2010/main" val="0"/>
@@ -3967,7 +4497,7 @@
       <p:sp>
         <p:nvSpPr>
           <p:cNvPr id="6" name="TextBox 5">
-            <a:hlinkClick r:id="rId4" action="ppaction://hlinksldjump"/>
+            <a:hlinkClick r:id="rId5" action="ppaction://hlinksldjump"/>
           </p:cNvPr>
           <p:cNvSpPr txBox="1"/>
           <p:nvPr/>
@@ -3990,11 +4520,40 @@
           <a:p>
             <a:r>
               <a:rPr lang="en-US" sz="1400" dirty="0" smtClean="0">
-                <a:hlinkClick r:id="rId5" action="ppaction://hlinksldjump"/>
+                <a:hlinkClick r:id="rId6" action="ppaction://hlinksldjump"/>
               </a:rPr>
               <a:t>Researcher Log In</a:t>
             </a:r>
             <a:endParaRPr lang="en-US" sz="1400" dirty="0"/>
+          </a:p>
+        </p:txBody>
+      </p:sp>
+      <p:sp>
+        <p:nvSpPr>
+          <p:cNvPr id="7" name="Rectangle 6"/>
+          <p:cNvSpPr/>
+          <p:nvPr/>
+        </p:nvSpPr>
+        <p:spPr>
+          <a:xfrm>
+            <a:off x="622300" y="6211669"/>
+            <a:ext cx="8216900" cy="338554"/>
+          </a:xfrm>
+          <a:prstGeom prst="rect">
+            <a:avLst/>
+          </a:prstGeom>
+        </p:spPr>
+        <p:txBody>
+          <a:bodyPr wrap="square">
+            <a:spAutoFit/>
+          </a:bodyPr>
+          <a:lstStyle/>
+          <a:p>
+            <a:r>
+              <a:rPr lang="en-US" sz="1600" dirty="0"/>
+              <a:t>From Here a user would select the date block of the experiment they wanted to sign up for.</a:t>
+            </a:r>
+            <a:endParaRPr lang="en-US" sz="1600" dirty="0"/>
           </a:p>
         </p:txBody>
       </p:sp>
@@ -4043,7 +4602,7 @@
         </p:nvSpPr>
         <p:spPr>
           <a:xfrm>
-            <a:off x="946150" y="838200"/>
+            <a:off x="933450" y="838200"/>
             <a:ext cx="6489700" cy="5257800"/>
           </a:xfrm>
           <a:prstGeom prst="rect">
@@ -4173,13 +4732,8 @@
             </a:pPr>
             <a:r>
               <a:rPr lang="en-US" dirty="0" smtClean="0"/>
-              <a:t>Qualification #</a:t>
-            </a:r>
-            <a:r>
-              <a:rPr lang="en-US" dirty="0" smtClean="0"/>
-              <a:t>5</a:t>
-            </a:r>
-            <a:endParaRPr lang="en-US" dirty="0" smtClean="0"/>
+              <a:t>Qualification #5</a:t>
+            </a:r>
           </a:p>
         </p:txBody>
       </p:sp>
@@ -4432,6 +4986,35 @@
               <a:t>Time3</a:t>
             </a:r>
             <a:endParaRPr lang="en-US" dirty="0"/>
+          </a:p>
+        </p:txBody>
+      </p:sp>
+      <p:sp>
+        <p:nvSpPr>
+          <p:cNvPr id="10" name="Rectangle 9"/>
+          <p:cNvSpPr/>
+          <p:nvPr/>
+        </p:nvSpPr>
+        <p:spPr>
+          <a:xfrm>
+            <a:off x="152400" y="6087586"/>
+            <a:ext cx="8686800" cy="738664"/>
+          </a:xfrm>
+          <a:prstGeom prst="rect">
+            <a:avLst/>
+          </a:prstGeom>
+        </p:spPr>
+        <p:txBody>
+          <a:bodyPr wrap="square">
+            <a:spAutoFit/>
+          </a:bodyPr>
+          <a:lstStyle/>
+          <a:p>
+            <a:r>
+              <a:rPr lang="en-US" sz="1400" dirty="0"/>
+              <a:t>This screen shows the experiment qualifications, the Dates and times of the experiment, what researcher is running the experiment, a section for notes and also a link to sign up for the experiment.  A user would review the information and hopefully sign up.</a:t>
+            </a:r>
+            <a:endParaRPr lang="en-US" sz="1400" dirty="0"/>
           </a:p>
         </p:txBody>
       </p:sp>
@@ -4817,6 +5400,35 @@
           </a:p>
         </p:txBody>
       </p:sp>
+      <p:sp>
+        <p:nvSpPr>
+          <p:cNvPr id="11" name="Rectangle 10"/>
+          <p:cNvSpPr/>
+          <p:nvPr/>
+        </p:nvSpPr>
+        <p:spPr>
+          <a:xfrm>
+            <a:off x="1460500" y="5029200"/>
+            <a:ext cx="6076950" cy="584775"/>
+          </a:xfrm>
+          <a:prstGeom prst="rect">
+            <a:avLst/>
+          </a:prstGeom>
+        </p:spPr>
+        <p:txBody>
+          <a:bodyPr wrap="square">
+            <a:spAutoFit/>
+          </a:bodyPr>
+          <a:lstStyle/>
+          <a:p>
+            <a:r>
+              <a:rPr lang="en-US" sz="1600" dirty="0"/>
+              <a:t>This screen allows a participant to sign up for the experiment and agree to meet all the qualifications.</a:t>
+            </a:r>
+            <a:endParaRPr lang="en-US" sz="1600" dirty="0"/>
+          </a:p>
+        </p:txBody>
+      </p:sp>
     </p:spTree>
     <p:extLst>
       <p:ext uri="{BB962C8B-B14F-4D97-AF65-F5344CB8AC3E}">
@@ -5070,11 +5682,40 @@
           <a:p>
             <a:r>
               <a:rPr lang="en-US" dirty="0" smtClean="0">
-                <a:hlinkClick r:id="rId2" action="ppaction://hlinksldjump"/>
+                <a:hlinkClick r:id="rId3" action="ppaction://hlinksldjump"/>
               </a:rPr>
               <a:t>Log In</a:t>
             </a:r>
             <a:endParaRPr lang="en-US" dirty="0"/>
+          </a:p>
+        </p:txBody>
+      </p:sp>
+      <p:sp>
+        <p:nvSpPr>
+          <p:cNvPr id="8" name="Rectangle 7"/>
+          <p:cNvSpPr/>
+          <p:nvPr/>
+        </p:nvSpPr>
+        <p:spPr>
+          <a:xfrm>
+            <a:off x="1676400" y="5181600"/>
+            <a:ext cx="4572000" cy="338554"/>
+          </a:xfrm>
+          <a:prstGeom prst="rect">
+            <a:avLst/>
+          </a:prstGeom>
+        </p:spPr>
+        <p:txBody>
+          <a:bodyPr>
+            <a:spAutoFit/>
+          </a:bodyPr>
+          <a:lstStyle/>
+          <a:p>
+            <a:r>
+              <a:rPr lang="en-US" sz="1600" dirty="0"/>
+              <a:t>A researcher would log in to their account from here.</a:t>
+            </a:r>
+            <a:endParaRPr lang="en-US" sz="1600" dirty="0"/>
           </a:p>
         </p:txBody>
       </p:sp>
@@ -5365,6 +6006,35 @@
           </a:extLst>
         </p:spPr>
       </p:pic>
+      <p:sp>
+        <p:nvSpPr>
+          <p:cNvPr id="4" name="Rectangle 3"/>
+          <p:cNvSpPr/>
+          <p:nvPr/>
+        </p:nvSpPr>
+        <p:spPr>
+          <a:xfrm>
+            <a:off x="596900" y="6172200"/>
+            <a:ext cx="4015073" cy="338554"/>
+          </a:xfrm>
+          <a:prstGeom prst="rect">
+            <a:avLst/>
+          </a:prstGeom>
+        </p:spPr>
+        <p:txBody>
+          <a:bodyPr wrap="none">
+            <a:spAutoFit/>
+          </a:bodyPr>
+          <a:lstStyle/>
+          <a:p>
+            <a:r>
+              <a:rPr lang="en-US" sz="1600" dirty="0"/>
+              <a:t>A researcher’s possible screen after signing in.</a:t>
+            </a:r>
+            <a:endParaRPr lang="en-US" sz="1600" dirty="0"/>
+          </a:p>
+        </p:txBody>
+      </p:sp>
     </p:spTree>
     <p:extLst>
       <p:ext uri="{BB962C8B-B14F-4D97-AF65-F5344CB8AC3E}">
@@ -5966,6 +6636,35 @@
           </a:p>
         </p:txBody>
       </p:sp>
+      <p:sp>
+        <p:nvSpPr>
+          <p:cNvPr id="10" name="Rectangle 9"/>
+          <p:cNvSpPr/>
+          <p:nvPr/>
+        </p:nvSpPr>
+        <p:spPr>
+          <a:xfrm>
+            <a:off x="565150" y="6099086"/>
+            <a:ext cx="8153400" cy="584775"/>
+          </a:xfrm>
+          <a:prstGeom prst="rect">
+            <a:avLst/>
+          </a:prstGeom>
+        </p:spPr>
+        <p:txBody>
+          <a:bodyPr wrap="square">
+            <a:spAutoFit/>
+          </a:bodyPr>
+          <a:lstStyle/>
+          <a:p>
+            <a:r>
+              <a:rPr lang="en-US" sz="1600" dirty="0"/>
+              <a:t>From this screen a researcher could add description or notes and also qualifications.  Also, the researcher could view the participants.</a:t>
+            </a:r>
+            <a:endParaRPr lang="en-US" sz="1600" dirty="0"/>
+          </a:p>
+        </p:txBody>
+      </p:sp>
     </p:spTree>
     <p:extLst>
       <p:ext uri="{BB962C8B-B14F-4D97-AF65-F5344CB8AC3E}">
@@ -6097,7 +6796,7 @@
           <a:p>
             <a:r>
               <a:rPr lang="en-US" dirty="0" smtClean="0">
-                <a:hlinkClick r:id="rId2" action="ppaction://hlinksldjump"/>
+                <a:hlinkClick r:id="rId3" action="ppaction://hlinksldjump"/>
               </a:rPr>
               <a:t>Create New Experiment</a:t>
             </a:r>
@@ -6186,13 +6885,13 @@
                     <a:p>
                       <a:r>
                         <a:rPr lang="en-US" dirty="0" smtClean="0">
-                          <a:hlinkClick r:id="rId2" action="ppaction://hlinksldjump"/>
+                          <a:hlinkClick r:id="rId3" action="ppaction://hlinksldjump"/>
                         </a:rPr>
                         <a:t>Robot</a:t>
                       </a:r>
                       <a:r>
                         <a:rPr lang="en-US" baseline="0" dirty="0" smtClean="0">
-                          <a:hlinkClick r:id="rId2" action="ppaction://hlinksldjump"/>
+                          <a:hlinkClick r:id="rId3" action="ppaction://hlinksldjump"/>
                         </a:rPr>
                         <a:t> Stuff</a:t>
                       </a:r>
@@ -6326,6 +7025,35 @@
           </a:graphicData>
         </a:graphic>
       </p:graphicFrame>
+      <p:sp>
+        <p:nvSpPr>
+          <p:cNvPr id="3" name="Rectangle 2"/>
+          <p:cNvSpPr/>
+          <p:nvPr/>
+        </p:nvSpPr>
+        <p:spPr>
+          <a:xfrm>
+            <a:off x="596900" y="5562600"/>
+            <a:ext cx="6718300" cy="369332"/>
+          </a:xfrm>
+          <a:prstGeom prst="rect">
+            <a:avLst/>
+          </a:prstGeom>
+        </p:spPr>
+        <p:txBody>
+          <a:bodyPr wrap="square">
+            <a:spAutoFit/>
+          </a:bodyPr>
+          <a:lstStyle/>
+          <a:p>
+            <a:r>
+              <a:rPr lang="en-US" dirty="0"/>
+              <a:t>This screen is an alternative to the calendar view for the researchers.</a:t>
+            </a:r>
+            <a:endParaRPr lang="en-US" dirty="0"/>
+          </a:p>
+        </p:txBody>
+      </p:sp>
     </p:spTree>
     <p:extLst>
       <p:ext uri="{BB962C8B-B14F-4D97-AF65-F5344CB8AC3E}">
@@ -6336,6 +7064,13 @@
   <p:clrMapOvr>
     <a:masterClrMapping/>
   </p:clrMapOvr>
+  <p:timing>
+    <p:tnLst>
+      <p:par>
+        <p:cTn id="1" dur="indefinite" restart="never" nodeType="tmRoot"/>
+      </p:par>
+    </p:tnLst>
+  </p:timing>
 </p:sld>
 </file>
 
@@ -6816,7 +7551,7 @@
       <p:sp>
         <p:nvSpPr>
           <p:cNvPr id="9" name="TextBox 8">
-            <a:hlinkClick r:id="rId2" action="ppaction://hlinksldjump"/>
+            <a:hlinkClick r:id="rId3" action="ppaction://hlinksldjump"/>
           </p:cNvPr>
           <p:cNvSpPr txBox="1"/>
           <p:nvPr/>
@@ -6839,11 +7574,40 @@
           <a:p>
             <a:r>
               <a:rPr lang="en-US" sz="1400" dirty="0" smtClean="0">
-                <a:hlinkClick r:id="rId3" action="ppaction://hlinksldjump"/>
+                <a:hlinkClick r:id="rId4" action="ppaction://hlinksldjump"/>
               </a:rPr>
               <a:t>Researcher Log In</a:t>
             </a:r>
             <a:endParaRPr lang="en-US" sz="1400" dirty="0"/>
+          </a:p>
+        </p:txBody>
+      </p:sp>
+      <p:sp>
+        <p:nvSpPr>
+          <p:cNvPr id="6" name="Rectangle 5"/>
+          <p:cNvSpPr/>
+          <p:nvPr/>
+        </p:nvSpPr>
+        <p:spPr>
+          <a:xfrm>
+            <a:off x="596900" y="6172200"/>
+            <a:ext cx="8153400" cy="369332"/>
+          </a:xfrm>
+          <a:prstGeom prst="rect">
+            <a:avLst/>
+          </a:prstGeom>
+        </p:spPr>
+        <p:txBody>
+          <a:bodyPr wrap="square">
+            <a:spAutoFit/>
+          </a:bodyPr>
+          <a:lstStyle/>
+          <a:p>
+            <a:r>
+              <a:rPr lang="en-US" dirty="0"/>
+              <a:t>This screen is an alternative to the calendar view for the participants.</a:t>
+            </a:r>
+            <a:endParaRPr lang="en-US" dirty="0"/>
           </a:p>
         </p:txBody>
       </p:sp>
@@ -6857,6 +7621,13 @@
   <p:clrMapOvr>
     <a:masterClrMapping/>
   </p:clrMapOvr>
+  <p:timing>
+    <p:tnLst>
+      <p:par>
+        <p:cTn id="1" dur="indefinite" restart="never" nodeType="tmRoot"/>
+      </p:par>
+    </p:tnLst>
+  </p:timing>
 </p:sld>
 </file>
 
@@ -7428,4 +8199,289 @@
   <a:objectDefaults/>
   <a:extraClrSchemeLst/>
 </a:theme>
+</file>
+
+<file path=ppt/theme/theme3.xml><?xml version="1.0" encoding="utf-8"?>
+<a:theme xmlns:a="http://schemas.openxmlformats.org/drawingml/2006/main" name="Office Theme">
+  <a:themeElements>
+    <a:clrScheme name="Office">
+      <a:dk1>
+        <a:sysClr val="windowText" lastClr="000000"/>
+      </a:dk1>
+      <a:lt1>
+        <a:sysClr val="window" lastClr="FFFFFF"/>
+      </a:lt1>
+      <a:dk2>
+        <a:srgbClr val="1F497D"/>
+      </a:dk2>
+      <a:lt2>
+        <a:srgbClr val="EEECE1"/>
+      </a:lt2>
+      <a:accent1>
+        <a:srgbClr val="4F81BD"/>
+      </a:accent1>
+      <a:accent2>
+        <a:srgbClr val="C0504D"/>
+      </a:accent2>
+      <a:accent3>
+        <a:srgbClr val="9BBB59"/>
+      </a:accent3>
+      <a:accent4>
+        <a:srgbClr val="8064A2"/>
+      </a:accent4>
+      <a:accent5>
+        <a:srgbClr val="4BACC6"/>
+      </a:accent5>
+      <a:accent6>
+        <a:srgbClr val="F79646"/>
+      </a:accent6>
+      <a:hlink>
+        <a:srgbClr val="0000FF"/>
+      </a:hlink>
+      <a:folHlink>
+        <a:srgbClr val="800080"/>
+      </a:folHlink>
+    </a:clrScheme>
+    <a:fontScheme name="Office">
+      <a:majorFont>
+        <a:latin typeface="Calibri"/>
+        <a:ea typeface=""/>
+        <a:cs typeface=""/>
+        <a:font script="Jpan" typeface="ＭＳ Ｐゴシック"/>
+        <a:font script="Hang" typeface="맑은 고딕"/>
+        <a:font script="Hans" typeface="宋体"/>
+        <a:font script="Hant" typeface="新細明體"/>
+        <a:font script="Arab" typeface="Times New Roman"/>
+        <a:font script="Hebr" typeface="Times New Roman"/>
+        <a:font script="Thai" typeface="Angsana New"/>
+        <a:font script="Ethi" typeface="Nyala"/>
+        <a:font script="Beng" typeface="Vrinda"/>
+        <a:font script="Gujr" typeface="Shruti"/>
+        <a:font script="Khmr" typeface="MoolBoran"/>
+        <a:font script="Knda" typeface="Tunga"/>
+        <a:font script="Guru" typeface="Raavi"/>
+        <a:font script="Cans" typeface="Euphemia"/>
+        <a:font script="Cher" typeface="Plantagenet Cherokee"/>
+        <a:font script="Yiii" typeface="Microsoft Yi Baiti"/>
+        <a:font script="Tibt" typeface="Microsoft Himalaya"/>
+        <a:font script="Thaa" typeface="MV Boli"/>
+        <a:font script="Deva" typeface="Mangal"/>
+        <a:font script="Telu" typeface="Gautami"/>
+        <a:font script="Taml" typeface="Latha"/>
+        <a:font script="Syrc" typeface="Estrangelo Edessa"/>
+        <a:font script="Orya" typeface="Kalinga"/>
+        <a:font script="Mlym" typeface="Kartika"/>
+        <a:font script="Laoo" typeface="DokChampa"/>
+        <a:font script="Sinh" typeface="Iskoola Pota"/>
+        <a:font script="Mong" typeface="Mongolian Baiti"/>
+        <a:font script="Viet" typeface="Times New Roman"/>
+        <a:font script="Uigh" typeface="Microsoft Uighur"/>
+        <a:font script="Geor" typeface="Sylfaen"/>
+      </a:majorFont>
+      <a:minorFont>
+        <a:latin typeface="Calibri"/>
+        <a:ea typeface=""/>
+        <a:cs typeface=""/>
+        <a:font script="Jpan" typeface="ＭＳ Ｐゴシック"/>
+        <a:font script="Hang" typeface="맑은 고딕"/>
+        <a:font script="Hans" typeface="宋体"/>
+        <a:font script="Hant" typeface="新細明體"/>
+        <a:font script="Arab" typeface="Arial"/>
+        <a:font script="Hebr" typeface="Arial"/>
+        <a:font script="Thai" typeface="Cordia New"/>
+        <a:font script="Ethi" typeface="Nyala"/>
+        <a:font script="Beng" typeface="Vrinda"/>
+        <a:font script="Gujr" typeface="Shruti"/>
+        <a:font script="Khmr" typeface="DaunPenh"/>
+        <a:font script="Knda" typeface="Tunga"/>
+        <a:font script="Guru" typeface="Raavi"/>
+        <a:font script="Cans" typeface="Euphemia"/>
+        <a:font script="Cher" typeface="Plantagenet Cherokee"/>
+        <a:font script="Yiii" typeface="Microsoft Yi Baiti"/>
+        <a:font script="Tibt" typeface="Microsoft Himalaya"/>
+        <a:font script="Thaa" typeface="MV Boli"/>
+        <a:font script="Deva" typeface="Mangal"/>
+        <a:font script="Telu" typeface="Gautami"/>
+        <a:font script="Taml" typeface="Latha"/>
+        <a:font script="Syrc" typeface="Estrangelo Edessa"/>
+        <a:font script="Orya" typeface="Kalinga"/>
+        <a:font script="Mlym" typeface="Kartika"/>
+        <a:font script="Laoo" typeface="DokChampa"/>
+        <a:font script="Sinh" typeface="Iskoola Pota"/>
+        <a:font script="Mong" typeface="Mongolian Baiti"/>
+        <a:font script="Viet" typeface="Arial"/>
+        <a:font script="Uigh" typeface="Microsoft Uighur"/>
+        <a:font script="Geor" typeface="Sylfaen"/>
+      </a:minorFont>
+    </a:fontScheme>
+    <a:fmtScheme name="Office">
+      <a:fillStyleLst>
+        <a:solidFill>
+          <a:schemeClr val="phClr"/>
+        </a:solidFill>
+        <a:gradFill rotWithShape="1">
+          <a:gsLst>
+            <a:gs pos="0">
+              <a:schemeClr val="phClr">
+                <a:tint val="50000"/>
+                <a:satMod val="300000"/>
+              </a:schemeClr>
+            </a:gs>
+            <a:gs pos="35000">
+              <a:schemeClr val="phClr">
+                <a:tint val="37000"/>
+                <a:satMod val="300000"/>
+              </a:schemeClr>
+            </a:gs>
+            <a:gs pos="100000">
+              <a:schemeClr val="phClr">
+                <a:tint val="15000"/>
+                <a:satMod val="350000"/>
+              </a:schemeClr>
+            </a:gs>
+          </a:gsLst>
+          <a:lin ang="16200000" scaled="1"/>
+        </a:gradFill>
+        <a:gradFill rotWithShape="1">
+          <a:gsLst>
+            <a:gs pos="0">
+              <a:schemeClr val="phClr">
+                <a:shade val="51000"/>
+                <a:satMod val="130000"/>
+              </a:schemeClr>
+            </a:gs>
+            <a:gs pos="80000">
+              <a:schemeClr val="phClr">
+                <a:shade val="93000"/>
+                <a:satMod val="130000"/>
+              </a:schemeClr>
+            </a:gs>
+            <a:gs pos="100000">
+              <a:schemeClr val="phClr">
+                <a:shade val="94000"/>
+                <a:satMod val="135000"/>
+              </a:schemeClr>
+            </a:gs>
+          </a:gsLst>
+          <a:lin ang="16200000" scaled="0"/>
+        </a:gradFill>
+      </a:fillStyleLst>
+      <a:lnStyleLst>
+        <a:ln w="9525" cap="flat" cmpd="sng" algn="ctr">
+          <a:solidFill>
+            <a:schemeClr val="phClr">
+              <a:shade val="95000"/>
+              <a:satMod val="105000"/>
+            </a:schemeClr>
+          </a:solidFill>
+          <a:prstDash val="solid"/>
+        </a:ln>
+        <a:ln w="25400" cap="flat" cmpd="sng" algn="ctr">
+          <a:solidFill>
+            <a:schemeClr val="phClr"/>
+          </a:solidFill>
+          <a:prstDash val="solid"/>
+        </a:ln>
+        <a:ln w="38100" cap="flat" cmpd="sng" algn="ctr">
+          <a:solidFill>
+            <a:schemeClr val="phClr"/>
+          </a:solidFill>
+          <a:prstDash val="solid"/>
+        </a:ln>
+      </a:lnStyleLst>
+      <a:effectStyleLst>
+        <a:effectStyle>
+          <a:effectLst>
+            <a:outerShdw blurRad="40000" dist="20000" dir="5400000" rotWithShape="0">
+              <a:srgbClr val="000000">
+                <a:alpha val="38000"/>
+              </a:srgbClr>
+            </a:outerShdw>
+          </a:effectLst>
+        </a:effectStyle>
+        <a:effectStyle>
+          <a:effectLst>
+            <a:outerShdw blurRad="40000" dist="23000" dir="5400000" rotWithShape="0">
+              <a:srgbClr val="000000">
+                <a:alpha val="35000"/>
+              </a:srgbClr>
+            </a:outerShdw>
+          </a:effectLst>
+        </a:effectStyle>
+        <a:effectStyle>
+          <a:effectLst>
+            <a:outerShdw blurRad="40000" dist="23000" dir="5400000" rotWithShape="0">
+              <a:srgbClr val="000000">
+                <a:alpha val="35000"/>
+              </a:srgbClr>
+            </a:outerShdw>
+          </a:effectLst>
+          <a:scene3d>
+            <a:camera prst="orthographicFront">
+              <a:rot lat="0" lon="0" rev="0"/>
+            </a:camera>
+            <a:lightRig rig="threePt" dir="t">
+              <a:rot lat="0" lon="0" rev="1200000"/>
+            </a:lightRig>
+          </a:scene3d>
+          <a:sp3d>
+            <a:bevelT w="63500" h="25400"/>
+          </a:sp3d>
+        </a:effectStyle>
+      </a:effectStyleLst>
+      <a:bgFillStyleLst>
+        <a:solidFill>
+          <a:schemeClr val="phClr"/>
+        </a:solidFill>
+        <a:gradFill rotWithShape="1">
+          <a:gsLst>
+            <a:gs pos="0">
+              <a:schemeClr val="phClr">
+                <a:tint val="40000"/>
+                <a:satMod val="350000"/>
+              </a:schemeClr>
+            </a:gs>
+            <a:gs pos="40000">
+              <a:schemeClr val="phClr">
+                <a:tint val="45000"/>
+                <a:shade val="99000"/>
+                <a:satMod val="350000"/>
+              </a:schemeClr>
+            </a:gs>
+            <a:gs pos="100000">
+              <a:schemeClr val="phClr">
+                <a:shade val="20000"/>
+                <a:satMod val="255000"/>
+              </a:schemeClr>
+            </a:gs>
+          </a:gsLst>
+          <a:path path="circle">
+            <a:fillToRect l="50000" t="-80000" r="50000" b="180000"/>
+          </a:path>
+        </a:gradFill>
+        <a:gradFill rotWithShape="1">
+          <a:gsLst>
+            <a:gs pos="0">
+              <a:schemeClr val="phClr">
+                <a:tint val="80000"/>
+                <a:satMod val="300000"/>
+              </a:schemeClr>
+            </a:gs>
+            <a:gs pos="100000">
+              <a:schemeClr val="phClr">
+                <a:shade val="30000"/>
+                <a:satMod val="200000"/>
+              </a:schemeClr>
+            </a:gs>
+          </a:gsLst>
+          <a:path path="circle">
+            <a:fillToRect l="50000" t="50000" r="50000" b="50000"/>
+          </a:path>
+        </a:gradFill>
+      </a:bgFillStyleLst>
+    </a:fmtScheme>
+  </a:themeElements>
+  <a:objectDefaults/>
+  <a:extraClrSchemeLst/>
+</a:theme>
 </file>
</xml_diff>